<commit_message>
Cleaned up Day 1 stuff
</commit_message>
<xml_diff>
--- a/University of Illinois REU Introduction to Matlab Day 1.pptx
+++ b/University of Illinois REU Introduction to Matlab Day 1.pptx
@@ -13,7 +13,10 @@
     <p:sldId id="260" r:id="rId7"/>
     <p:sldId id="262" r:id="rId8"/>
     <p:sldId id="264" r:id="rId9"/>
-    <p:sldId id="267" r:id="rId10"/>
+    <p:sldId id="270" r:id="rId10"/>
+    <p:sldId id="267" r:id="rId11"/>
+    <p:sldId id="271" r:id="rId12"/>
+    <p:sldId id="272" r:id="rId13"/>
   </p:sldIdLst>
   <p:sldSz cx="12192000" cy="6858000"/>
   <p:notesSz cx="6858000" cy="9144000"/>
@@ -249,7 +252,7 @@
           <a:p>
             <a:fld id="{4F813D5D-9D8E-4484-BE86-4458FD589FAD}" type="datetimeFigureOut">
               <a:rPr lang="en-US" smtClean="0"/>
-              <a:t>5/29/2017</a:t>
+              <a:t>6/16/2017</a:t>
             </a:fld>
             <a:endParaRPr lang="en-US"/>
           </a:p>
@@ -417,7 +420,7 @@
           <a:p>
             <a:fld id="{4F813D5D-9D8E-4484-BE86-4458FD589FAD}" type="datetimeFigureOut">
               <a:rPr lang="en-US" smtClean="0"/>
-              <a:t>5/29/2017</a:t>
+              <a:t>6/16/2017</a:t>
             </a:fld>
             <a:endParaRPr lang="en-US"/>
           </a:p>
@@ -595,7 +598,7 @@
           <a:p>
             <a:fld id="{4F813D5D-9D8E-4484-BE86-4458FD589FAD}" type="datetimeFigureOut">
               <a:rPr lang="en-US" smtClean="0"/>
-              <a:t>5/29/2017</a:t>
+              <a:t>6/16/2017</a:t>
             </a:fld>
             <a:endParaRPr lang="en-US"/>
           </a:p>
@@ -763,7 +766,7 @@
           <a:p>
             <a:fld id="{4F813D5D-9D8E-4484-BE86-4458FD589FAD}" type="datetimeFigureOut">
               <a:rPr lang="en-US" smtClean="0"/>
-              <a:t>5/29/2017</a:t>
+              <a:t>6/16/2017</a:t>
             </a:fld>
             <a:endParaRPr lang="en-US"/>
           </a:p>
@@ -1008,7 +1011,7 @@
           <a:p>
             <a:fld id="{4F813D5D-9D8E-4484-BE86-4458FD589FAD}" type="datetimeFigureOut">
               <a:rPr lang="en-US" smtClean="0"/>
-              <a:t>5/29/2017</a:t>
+              <a:t>6/16/2017</a:t>
             </a:fld>
             <a:endParaRPr lang="en-US"/>
           </a:p>
@@ -1237,7 +1240,7 @@
           <a:p>
             <a:fld id="{4F813D5D-9D8E-4484-BE86-4458FD589FAD}" type="datetimeFigureOut">
               <a:rPr lang="en-US" smtClean="0"/>
-              <a:t>5/29/2017</a:t>
+              <a:t>6/16/2017</a:t>
             </a:fld>
             <a:endParaRPr lang="en-US"/>
           </a:p>
@@ -1601,7 +1604,7 @@
           <a:p>
             <a:fld id="{4F813D5D-9D8E-4484-BE86-4458FD589FAD}" type="datetimeFigureOut">
               <a:rPr lang="en-US" smtClean="0"/>
-              <a:t>5/29/2017</a:t>
+              <a:t>6/16/2017</a:t>
             </a:fld>
             <a:endParaRPr lang="en-US"/>
           </a:p>
@@ -1718,7 +1721,7 @@
           <a:p>
             <a:fld id="{4F813D5D-9D8E-4484-BE86-4458FD589FAD}" type="datetimeFigureOut">
               <a:rPr lang="en-US" smtClean="0"/>
-              <a:t>5/29/2017</a:t>
+              <a:t>6/16/2017</a:t>
             </a:fld>
             <a:endParaRPr lang="en-US"/>
           </a:p>
@@ -1813,7 +1816,7 @@
           <a:p>
             <a:fld id="{4F813D5D-9D8E-4484-BE86-4458FD589FAD}" type="datetimeFigureOut">
               <a:rPr lang="en-US" smtClean="0"/>
-              <a:t>5/29/2017</a:t>
+              <a:t>6/16/2017</a:t>
             </a:fld>
             <a:endParaRPr lang="en-US"/>
           </a:p>
@@ -2088,7 +2091,7 @@
           <a:p>
             <a:fld id="{4F813D5D-9D8E-4484-BE86-4458FD589FAD}" type="datetimeFigureOut">
               <a:rPr lang="en-US" smtClean="0"/>
-              <a:t>5/29/2017</a:t>
+              <a:t>6/16/2017</a:t>
             </a:fld>
             <a:endParaRPr lang="en-US"/>
           </a:p>
@@ -2343,7 +2346,7 @@
           <a:p>
             <a:fld id="{4F813D5D-9D8E-4484-BE86-4458FD589FAD}" type="datetimeFigureOut">
               <a:rPr lang="en-US" smtClean="0"/>
-              <a:t>5/29/2017</a:t>
+              <a:t>6/16/2017</a:t>
             </a:fld>
             <a:endParaRPr lang="en-US"/>
           </a:p>
@@ -2590,7 +2593,7 @@
           <a:p>
             <a:fld id="{4F813D5D-9D8E-4484-BE86-4458FD589FAD}" type="datetimeFigureOut">
               <a:rPr lang="en-US" smtClean="0"/>
-              <a:t>5/29/2017</a:t>
+              <a:t>6/16/2017</a:t>
             </a:fld>
             <a:endParaRPr lang="en-US"/>
           </a:p>
@@ -3039,7 +3042,7 @@
         </p:nvSpPr>
         <p:spPr>
           <a:xfrm>
-            <a:off x="1652631" y="3467814"/>
+            <a:off x="2255745" y="2670146"/>
             <a:ext cx="3688360" cy="516956"/>
           </a:xfrm>
         </p:spPr>
@@ -3077,8 +3080,8 @@
         </p:blipFill>
         <p:spPr bwMode="auto">
           <a:xfrm>
-            <a:off x="7197754" y="4356952"/>
-            <a:ext cx="3363243" cy="1271959"/>
+            <a:off x="7366381" y="2670146"/>
+            <a:ext cx="4216717" cy="1594738"/>
           </a:xfrm>
           <a:prstGeom prst="rect">
             <a:avLst/>
@@ -3095,6 +3098,101 @@
           </a:extLst>
         </p:spPr>
       </p:pic>
+      <p:sp>
+        <p:nvSpPr>
+          <p:cNvPr id="4" name="TextBox 3"/>
+          <p:cNvSpPr txBox="1"/>
+          <p:nvPr/>
+        </p:nvSpPr>
+        <p:spPr>
+          <a:xfrm>
+            <a:off x="963039" y="3312019"/>
+            <a:ext cx="5165387" cy="2585323"/>
+          </a:xfrm>
+          <a:prstGeom prst="rect">
+            <a:avLst/>
+          </a:prstGeom>
+          <a:noFill/>
+        </p:spPr>
+        <p:txBody>
+          <a:bodyPr wrap="square" rtlCol="0">
+            <a:spAutoFit/>
+          </a:bodyPr>
+          <a:lstStyle/>
+          <a:p>
+            <a:r>
+              <a:rPr lang="en-US" dirty="0"/>
+              <a:t>This is designed to provide guided self learning of using </a:t>
+            </a:r>
+            <a:r>
+              <a:rPr lang="en-US" dirty="0" err="1"/>
+              <a:t>matlab</a:t>
+            </a:r>
+            <a:r>
+              <a:rPr lang="en-US" dirty="0"/>
+              <a:t> for analysis and plotting of data.  The self guided part is to enable you to go back later in the summer and relearn/refresh your </a:t>
+            </a:r>
+            <a:r>
+              <a:rPr lang="en-US" dirty="0" err="1"/>
+              <a:t>matlab</a:t>
+            </a:r>
+            <a:r>
+              <a:rPr lang="en-US" dirty="0"/>
+              <a:t> knowledge on your own.  </a:t>
+            </a:r>
+          </a:p>
+          <a:p>
+            <a:endParaRPr lang="en-US" dirty="0"/>
+          </a:p>
+          <a:p>
+            <a:r>
+              <a:rPr lang="en-US" dirty="0"/>
+              <a:t>One big frustration is when an error happens that is syntax related.  If this happens asking the TA is a good thing to do.    </a:t>
+            </a:r>
+          </a:p>
+        </p:txBody>
+      </p:sp>
+      <p:pic>
+        <p:nvPicPr>
+          <p:cNvPr id="5" name="Picture 2" descr="Image result for NSF REU"/>
+          <p:cNvPicPr>
+            <a:picLocks noChangeAspect="1" noChangeArrowheads="1"/>
+          </p:cNvPicPr>
+          <p:nvPr/>
+        </p:nvPicPr>
+        <p:blipFill>
+          <a:blip r:embed="rId3">
+            <a:extLst>
+              <a:ext uri="{28A0092B-C50C-407E-A947-70E740481C1C}">
+                <a14:useLocalDpi xmlns:a14="http://schemas.microsoft.com/office/drawing/2010/main" val="0"/>
+              </a:ext>
+            </a:extLst>
+          </a:blip>
+          <a:srcRect/>
+          <a:stretch>
+            <a:fillRect/>
+          </a:stretch>
+        </p:blipFill>
+        <p:spPr bwMode="auto">
+          <a:xfrm>
+            <a:off x="6935820" y="4337718"/>
+            <a:ext cx="4789251" cy="1559624"/>
+          </a:xfrm>
+          <a:prstGeom prst="rect">
+            <a:avLst/>
+          </a:prstGeom>
+          <a:noFill/>
+          <a:extLst>
+            <a:ext uri="{909E8E84-426E-40DD-AFC4-6F175D3DCCD1}">
+              <a14:hiddenFill xmlns:a14="http://schemas.microsoft.com/office/drawing/2010/main">
+                <a:solidFill>
+                  <a:srgbClr val="FFFFFF"/>
+                </a:solidFill>
+              </a14:hiddenFill>
+            </a:ext>
+          </a:extLst>
+        </p:spPr>
+      </p:pic>
     </p:spTree>
     <p:extLst>
       <p:ext uri="{BB962C8B-B14F-4D97-AF65-F5344CB8AC3E}">
@@ -3105,6 +3203,1019 @@
   <p:clrMapOvr>
     <a:masterClrMapping/>
   </p:clrMapOvr>
+</p:sld>
+</file>
+
+<file path=ppt/slides/slide10.xml><?xml version="1.0" encoding="utf-8"?>
+<p:sld xmlns:a="http://schemas.openxmlformats.org/drawingml/2006/main" xmlns:r="http://schemas.openxmlformats.org/officeDocument/2006/relationships" xmlns:p="http://schemas.openxmlformats.org/presentationml/2006/main">
+  <p:cSld>
+    <p:spTree>
+      <p:nvGrpSpPr>
+        <p:cNvPr id="1" name=""/>
+        <p:cNvGrpSpPr/>
+        <p:nvPr/>
+      </p:nvGrpSpPr>
+      <p:grpSpPr>
+        <a:xfrm>
+          <a:off x="0" y="0"/>
+          <a:ext cx="0" cy="0"/>
+          <a:chOff x="0" y="0"/>
+          <a:chExt cx="0" cy="0"/>
+        </a:xfrm>
+      </p:grpSpPr>
+      <p:sp>
+        <p:nvSpPr>
+          <p:cNvPr id="2" name="Title 1"/>
+          <p:cNvSpPr>
+            <a:spLocks noGrp="1"/>
+          </p:cNvSpPr>
+          <p:nvPr>
+            <p:ph type="title"/>
+          </p:nvPr>
+        </p:nvSpPr>
+        <p:spPr/>
+        <p:txBody>
+          <a:bodyPr/>
+          <a:lstStyle/>
+          <a:p>
+            <a:r>
+              <a:rPr lang="en-US" dirty="0"/>
+              <a:t>2014 Boston Marathon Data</a:t>
+            </a:r>
+          </a:p>
+        </p:txBody>
+      </p:sp>
+      <p:sp>
+        <p:nvSpPr>
+          <p:cNvPr id="3" name="Content Placeholder 2"/>
+          <p:cNvSpPr>
+            <a:spLocks noGrp="1"/>
+          </p:cNvSpPr>
+          <p:nvPr>
+            <p:ph idx="1"/>
+          </p:nvPr>
+        </p:nvSpPr>
+        <p:spPr>
+          <a:xfrm>
+            <a:off x="569670" y="1525317"/>
+            <a:ext cx="11191070" cy="1431891"/>
+          </a:xfrm>
+        </p:spPr>
+        <p:txBody>
+          <a:bodyPr>
+            <a:normAutofit fontScale="92500"/>
+          </a:bodyPr>
+          <a:lstStyle/>
+          <a:p>
+            <a:pPr marL="0" indent="0">
+              <a:buNone/>
+            </a:pPr>
+            <a:r>
+              <a:rPr lang="en-US" dirty="0"/>
+              <a:t>As the last step, we will explore different plotting functions using some test data.  The test data set is the 2014 Boston Marathon Results.  The original data can be found on </a:t>
+            </a:r>
+            <a:r>
+              <a:rPr lang="en-US" dirty="0" err="1"/>
+              <a:t>Git</a:t>
+            </a:r>
+            <a:r>
+              <a:rPr lang="en-US" dirty="0"/>
+              <a:t> Hub here, but a cleaner version is in the </a:t>
+            </a:r>
+            <a:r>
+              <a:rPr lang="en-US" dirty="0" err="1"/>
+              <a:t>Matlab</a:t>
+            </a:r>
+            <a:r>
+              <a:rPr lang="en-US" dirty="0"/>
+              <a:t> Intro Folder.</a:t>
+            </a:r>
+          </a:p>
+        </p:txBody>
+      </p:sp>
+      <p:pic>
+        <p:nvPicPr>
+          <p:cNvPr id="4" name="Picture 3"/>
+          <p:cNvPicPr>
+            <a:picLocks noChangeAspect="1"/>
+          </p:cNvPicPr>
+          <p:nvPr/>
+        </p:nvPicPr>
+        <p:blipFill>
+          <a:blip r:embed="rId2"/>
+          <a:stretch>
+            <a:fillRect/>
+          </a:stretch>
+        </p:blipFill>
+        <p:spPr>
+          <a:xfrm>
+            <a:off x="8426846" y="2743875"/>
+            <a:ext cx="2282170" cy="3835231"/>
+          </a:xfrm>
+          <a:prstGeom prst="rect">
+            <a:avLst/>
+          </a:prstGeom>
+        </p:spPr>
+      </p:pic>
+      <p:sp>
+        <p:nvSpPr>
+          <p:cNvPr id="5" name="TextBox 4"/>
+          <p:cNvSpPr txBox="1"/>
+          <p:nvPr/>
+        </p:nvSpPr>
+        <p:spPr>
+          <a:xfrm>
+            <a:off x="314630" y="3122579"/>
+            <a:ext cx="7161956" cy="1846659"/>
+          </a:xfrm>
+          <a:prstGeom prst="rect">
+            <a:avLst/>
+          </a:prstGeom>
+          <a:noFill/>
+        </p:spPr>
+        <p:txBody>
+          <a:bodyPr wrap="square" rtlCol="0">
+            <a:spAutoFit/>
+          </a:bodyPr>
+          <a:lstStyle/>
+          <a:p>
+            <a:r>
+              <a:rPr lang="en-US" sz="1600" b="1" u="sng" dirty="0"/>
+              <a:t>Explanation of Data Labels</a:t>
+            </a:r>
+          </a:p>
+          <a:p>
+            <a:pPr lvl="1"/>
+            <a:r>
+              <a:rPr lang="en-US" sz="1400" dirty="0"/>
+              <a:t>Age – Runner’s Age</a:t>
+            </a:r>
+          </a:p>
+          <a:p>
+            <a:pPr lvl="1"/>
+            <a:r>
+              <a:rPr lang="en-US" sz="1400" dirty="0"/>
+              <a:t>Bib – Runners Bib Number (w# is for wheel chair athletes)</a:t>
+            </a:r>
+          </a:p>
+          <a:p>
+            <a:pPr lvl="1"/>
+            <a:r>
+              <a:rPr lang="en-US" sz="1400" dirty="0" err="1"/>
+              <a:t>Divisionplace</a:t>
+            </a:r>
+            <a:r>
+              <a:rPr lang="en-US" sz="1400" dirty="0"/>
+              <a:t> – Place in their division (age, gender, mobility)</a:t>
+            </a:r>
+            <a:endParaRPr lang="en-US" sz="1400" dirty="0"/>
+          </a:p>
+          <a:p>
+            <a:pPr lvl="1"/>
+            <a:r>
+              <a:rPr lang="en-US" sz="1400" dirty="0"/>
+              <a:t>City – City of Origin</a:t>
+            </a:r>
+          </a:p>
+          <a:p>
+            <a:pPr lvl="1"/>
+            <a:r>
+              <a:rPr lang="en-US" sz="1400" dirty="0"/>
+              <a:t>Country – Country of Residence</a:t>
+            </a:r>
+          </a:p>
+          <a:p>
+            <a:pPr lvl="1"/>
+            <a:r>
+              <a:rPr lang="en-US" sz="1400" dirty="0" err="1"/>
+              <a:t>Ctz</a:t>
+            </a:r>
+            <a:r>
+              <a:rPr lang="en-US" sz="1400" dirty="0"/>
+              <a:t> - Citizenship</a:t>
+            </a:r>
+          </a:p>
+          <a:p>
+            <a:pPr lvl="1"/>
+            <a:r>
+              <a:rPr lang="en-US" sz="1400" dirty="0"/>
+              <a:t>Gender – Male or Female</a:t>
+            </a:r>
+          </a:p>
+        </p:txBody>
+      </p:sp>
+      <p:sp>
+        <p:nvSpPr>
+          <p:cNvPr id="6" name="Rectangle 5"/>
+          <p:cNvSpPr/>
+          <p:nvPr/>
+        </p:nvSpPr>
+        <p:spPr>
+          <a:xfrm>
+            <a:off x="3125822" y="4300631"/>
+            <a:ext cx="6096000" cy="1815882"/>
+          </a:xfrm>
+          <a:prstGeom prst="rect">
+            <a:avLst/>
+          </a:prstGeom>
+        </p:spPr>
+        <p:txBody>
+          <a:bodyPr>
+            <a:spAutoFit/>
+          </a:bodyPr>
+          <a:lstStyle/>
+          <a:p>
+            <a:pPr lvl="1"/>
+            <a:r>
+              <a:rPr lang="en-US" sz="1400" dirty="0" err="1"/>
+              <a:t>Genderplace</a:t>
+            </a:r>
+            <a:r>
+              <a:rPr lang="en-US" sz="1400" dirty="0"/>
+              <a:t> – Overall Place for their Gender</a:t>
+            </a:r>
+          </a:p>
+          <a:p>
+            <a:pPr lvl="1"/>
+            <a:r>
+              <a:rPr lang="en-US" sz="1400" dirty="0"/>
+              <a:t>Halftime -  Half Marathon Time</a:t>
+            </a:r>
+          </a:p>
+          <a:p>
+            <a:pPr lvl="1"/>
+            <a:r>
+              <a:rPr lang="en-US" sz="1400" dirty="0" err="1"/>
+              <a:t>Milepace</a:t>
+            </a:r>
+            <a:r>
+              <a:rPr lang="en-US" sz="1400" dirty="0"/>
+              <a:t> – Average Mile time for the full marathon</a:t>
+            </a:r>
+          </a:p>
+          <a:p>
+            <a:pPr lvl="1"/>
+            <a:r>
+              <a:rPr lang="en-US" sz="1400" dirty="0"/>
+              <a:t>Name – Runner’s Name</a:t>
+            </a:r>
+          </a:p>
+          <a:p>
+            <a:pPr lvl="1"/>
+            <a:r>
+              <a:rPr lang="en-US" sz="1400" dirty="0" err="1"/>
+              <a:t>Officialtime</a:t>
+            </a:r>
+            <a:r>
+              <a:rPr lang="en-US" sz="1400" dirty="0"/>
+              <a:t> – Full Marathon Time (26.2 miles)</a:t>
+            </a:r>
+          </a:p>
+          <a:p>
+            <a:pPr lvl="1"/>
+            <a:r>
+              <a:rPr lang="en-US" sz="1400" dirty="0" err="1"/>
+              <a:t>Overallplace</a:t>
+            </a:r>
+            <a:r>
+              <a:rPr lang="en-US" sz="1400" dirty="0"/>
+              <a:t> – What place did they come in</a:t>
+            </a:r>
+          </a:p>
+          <a:p>
+            <a:pPr lvl="1"/>
+            <a:r>
+              <a:rPr lang="en-US" sz="1400" dirty="0"/>
+              <a:t>State – State of Residence</a:t>
+            </a:r>
+          </a:p>
+          <a:p>
+            <a:pPr lvl="1"/>
+            <a:r>
+              <a:rPr lang="en-US" sz="1400" dirty="0"/>
+              <a:t>Time[X]k – split at X kilometers through the race</a:t>
+            </a:r>
+          </a:p>
+        </p:txBody>
+      </p:sp>
+    </p:spTree>
+    <p:extLst>
+      <p:ext uri="{BB962C8B-B14F-4D97-AF65-F5344CB8AC3E}">
+        <p14:creationId xmlns:p14="http://schemas.microsoft.com/office/powerpoint/2010/main" val="4283949246"/>
+      </p:ext>
+    </p:extLst>
+  </p:cSld>
+  <p:clrMapOvr>
+    <a:masterClrMapping/>
+  </p:clrMapOvr>
+</p:sld>
+</file>
+
+<file path=ppt/slides/slide11.xml><?xml version="1.0" encoding="utf-8"?>
+<p:sld xmlns:a="http://schemas.openxmlformats.org/drawingml/2006/main" xmlns:r="http://schemas.openxmlformats.org/officeDocument/2006/relationships" xmlns:p="http://schemas.openxmlformats.org/presentationml/2006/main">
+  <p:cSld>
+    <p:spTree>
+      <p:nvGrpSpPr>
+        <p:cNvPr id="1" name=""/>
+        <p:cNvGrpSpPr/>
+        <p:nvPr/>
+      </p:nvGrpSpPr>
+      <p:grpSpPr>
+        <a:xfrm>
+          <a:off x="0" y="0"/>
+          <a:ext cx="0" cy="0"/>
+          <a:chOff x="0" y="0"/>
+          <a:chExt cx="0" cy="0"/>
+        </a:xfrm>
+      </p:grpSpPr>
+      <p:sp>
+        <p:nvSpPr>
+          <p:cNvPr id="2" name="Title 1"/>
+          <p:cNvSpPr>
+            <a:spLocks noGrp="1"/>
+          </p:cNvSpPr>
+          <p:nvPr>
+            <p:ph type="title"/>
+          </p:nvPr>
+        </p:nvSpPr>
+        <p:spPr/>
+        <p:txBody>
+          <a:bodyPr/>
+          <a:lstStyle/>
+          <a:p>
+            <a:r>
+              <a:rPr lang="en-US" dirty="0"/>
+              <a:t>2014 Boston Marathon Data</a:t>
+            </a:r>
+          </a:p>
+        </p:txBody>
+      </p:sp>
+      <p:sp>
+        <p:nvSpPr>
+          <p:cNvPr id="3" name="Content Placeholder 2"/>
+          <p:cNvSpPr>
+            <a:spLocks noGrp="1"/>
+          </p:cNvSpPr>
+          <p:nvPr>
+            <p:ph idx="1"/>
+          </p:nvPr>
+        </p:nvSpPr>
+        <p:spPr>
+          <a:xfrm>
+            <a:off x="569670" y="1525317"/>
+            <a:ext cx="11191070" cy="1675083"/>
+          </a:xfrm>
+        </p:spPr>
+        <p:txBody>
+          <a:bodyPr>
+            <a:normAutofit/>
+          </a:bodyPr>
+          <a:lstStyle/>
+          <a:p>
+            <a:pPr marL="0" indent="0">
+              <a:buNone/>
+            </a:pPr>
+            <a:r>
+              <a:rPr lang="en-US" dirty="0"/>
+              <a:t>As the last step, we will explore different plotting functions using some test data.  The test data set is the 2014 Boston Marathon Results.  The original data can be found on </a:t>
+            </a:r>
+            <a:r>
+              <a:rPr lang="en-US" dirty="0" err="1"/>
+              <a:t>Git</a:t>
+            </a:r>
+            <a:r>
+              <a:rPr lang="en-US" dirty="0"/>
+              <a:t> Hub </a:t>
+            </a:r>
+            <a:r>
+              <a:rPr lang="en-US" dirty="0">
+                <a:hlinkClick r:id="rId2"/>
+              </a:rPr>
+              <a:t>here</a:t>
+            </a:r>
+            <a:r>
+              <a:rPr lang="en-US" dirty="0"/>
+              <a:t>, but a cleaner version is in the </a:t>
+            </a:r>
+            <a:r>
+              <a:rPr lang="en-US" dirty="0" err="1"/>
+              <a:t>Matlab</a:t>
+            </a:r>
+            <a:r>
+              <a:rPr lang="en-US" dirty="0"/>
+              <a:t> Intro Folder.</a:t>
+            </a:r>
+          </a:p>
+        </p:txBody>
+      </p:sp>
+      <p:sp>
+        <p:nvSpPr>
+          <p:cNvPr id="9" name="Rectangle 8"/>
+          <p:cNvSpPr/>
+          <p:nvPr/>
+        </p:nvSpPr>
+        <p:spPr>
+          <a:xfrm>
+            <a:off x="264267" y="3573449"/>
+            <a:ext cx="7428689" cy="923330"/>
+          </a:xfrm>
+          <a:prstGeom prst="rect">
+            <a:avLst/>
+          </a:prstGeom>
+        </p:spPr>
+        <p:txBody>
+          <a:bodyPr wrap="square">
+            <a:spAutoFit/>
+          </a:bodyPr>
+          <a:lstStyle/>
+          <a:p>
+            <a:r>
+              <a:rPr lang="en-US" b="1" i="1" dirty="0"/>
+              <a:t>Try to import the Boston Marathon results into </a:t>
+            </a:r>
+            <a:r>
+              <a:rPr lang="en-US" b="1" i="1" dirty="0" err="1"/>
+              <a:t>Matlab</a:t>
+            </a:r>
+            <a:r>
+              <a:rPr lang="en-US" b="1" i="1" dirty="0"/>
+              <a:t> and make some plots that provide some insight into the results of the Boston Marathon.  Here are some examples to get you thinking</a:t>
+            </a:r>
+          </a:p>
+        </p:txBody>
+      </p:sp>
+      <p:pic>
+        <p:nvPicPr>
+          <p:cNvPr id="13" name="Picture 12"/>
+          <p:cNvPicPr>
+            <a:picLocks noChangeAspect="1"/>
+          </p:cNvPicPr>
+          <p:nvPr/>
+        </p:nvPicPr>
+        <p:blipFill>
+          <a:blip r:embed="rId3"/>
+          <a:stretch>
+            <a:fillRect/>
+          </a:stretch>
+        </p:blipFill>
+        <p:spPr>
+          <a:xfrm>
+            <a:off x="8072230" y="3268679"/>
+            <a:ext cx="3281570" cy="2694244"/>
+          </a:xfrm>
+          <a:prstGeom prst="rect">
+            <a:avLst/>
+          </a:prstGeom>
+          <a:ln w="12700">
+            <a:solidFill>
+              <a:schemeClr val="tx1"/>
+            </a:solidFill>
+          </a:ln>
+        </p:spPr>
+      </p:pic>
+    </p:spTree>
+    <p:extLst>
+      <p:ext uri="{BB962C8B-B14F-4D97-AF65-F5344CB8AC3E}">
+        <p14:creationId xmlns:p14="http://schemas.microsoft.com/office/powerpoint/2010/main" val="3552595031"/>
+      </p:ext>
+    </p:extLst>
+  </p:cSld>
+  <p:clrMapOvr>
+    <a:masterClrMapping/>
+  </p:clrMapOvr>
+</p:sld>
+</file>
+
+<file path=ppt/slides/slide12.xml><?xml version="1.0" encoding="utf-8"?>
+<p:sld xmlns:a="http://schemas.openxmlformats.org/drawingml/2006/main" xmlns:r="http://schemas.openxmlformats.org/officeDocument/2006/relationships" xmlns:p="http://schemas.openxmlformats.org/presentationml/2006/main">
+  <p:cSld>
+    <p:spTree>
+      <p:nvGrpSpPr>
+        <p:cNvPr id="1" name=""/>
+        <p:cNvGrpSpPr/>
+        <p:nvPr/>
+      </p:nvGrpSpPr>
+      <p:grpSpPr>
+        <a:xfrm>
+          <a:off x="0" y="0"/>
+          <a:ext cx="0" cy="0"/>
+          <a:chOff x="0" y="0"/>
+          <a:chExt cx="0" cy="0"/>
+        </a:xfrm>
+      </p:grpSpPr>
+      <p:sp>
+        <p:nvSpPr>
+          <p:cNvPr id="2" name="Title 1"/>
+          <p:cNvSpPr>
+            <a:spLocks noGrp="1"/>
+          </p:cNvSpPr>
+          <p:nvPr>
+            <p:ph type="title"/>
+          </p:nvPr>
+        </p:nvSpPr>
+        <p:spPr>
+          <a:xfrm>
+            <a:off x="886839" y="384581"/>
+            <a:ext cx="10515600" cy="1325563"/>
+          </a:xfrm>
+        </p:spPr>
+        <p:txBody>
+          <a:bodyPr/>
+          <a:lstStyle/>
+          <a:p>
+            <a:r>
+              <a:rPr lang="en-US" dirty="0"/>
+              <a:t>2014 Boston Marathon Data</a:t>
+            </a:r>
+          </a:p>
+        </p:txBody>
+      </p:sp>
+      <p:pic>
+        <p:nvPicPr>
+          <p:cNvPr id="10" name="Picture 9"/>
+          <p:cNvPicPr>
+            <a:picLocks noChangeAspect="1"/>
+          </p:cNvPicPr>
+          <p:nvPr/>
+        </p:nvPicPr>
+        <p:blipFill>
+          <a:blip r:embed="rId2"/>
+          <a:stretch>
+            <a:fillRect/>
+          </a:stretch>
+        </p:blipFill>
+        <p:spPr>
+          <a:xfrm>
+            <a:off x="8307458" y="2750596"/>
+            <a:ext cx="3284638" cy="2696762"/>
+          </a:xfrm>
+          <a:prstGeom prst="rect">
+            <a:avLst/>
+          </a:prstGeom>
+          <a:ln w="12700">
+            <a:solidFill>
+              <a:schemeClr val="tx1"/>
+            </a:solidFill>
+          </a:ln>
+        </p:spPr>
+      </p:pic>
+      <p:pic>
+        <p:nvPicPr>
+          <p:cNvPr id="8" name="Picture 7"/>
+          <p:cNvPicPr>
+            <a:picLocks noChangeAspect="1"/>
+          </p:cNvPicPr>
+          <p:nvPr/>
+        </p:nvPicPr>
+        <p:blipFill>
+          <a:blip r:embed="rId3"/>
+          <a:stretch>
+            <a:fillRect/>
+          </a:stretch>
+        </p:blipFill>
+        <p:spPr>
+          <a:xfrm>
+            <a:off x="4595614" y="2750596"/>
+            <a:ext cx="3284638" cy="2696762"/>
+          </a:xfrm>
+          <a:prstGeom prst="rect">
+            <a:avLst/>
+          </a:prstGeom>
+          <a:ln w="12700">
+            <a:solidFill>
+              <a:schemeClr val="tx1"/>
+            </a:solidFill>
+          </a:ln>
+        </p:spPr>
+      </p:pic>
+      <p:sp>
+        <p:nvSpPr>
+          <p:cNvPr id="6" name="TextBox 5"/>
+          <p:cNvSpPr txBox="1"/>
+          <p:nvPr/>
+        </p:nvSpPr>
+        <p:spPr>
+          <a:xfrm>
+            <a:off x="980926" y="2045704"/>
+            <a:ext cx="2275688" cy="369332"/>
+          </a:xfrm>
+          <a:prstGeom prst="rect">
+            <a:avLst/>
+          </a:prstGeom>
+          <a:noFill/>
+        </p:spPr>
+        <p:txBody>
+          <a:bodyPr wrap="none" rtlCol="0">
+            <a:spAutoFit/>
+          </a:bodyPr>
+          <a:lstStyle/>
+          <a:p>
+            <a:r>
+              <a:rPr lang="en-US" dirty="0"/>
+              <a:t>Some Example Graphs</a:t>
+            </a:r>
+          </a:p>
+        </p:txBody>
+      </p:sp>
+      <p:pic>
+        <p:nvPicPr>
+          <p:cNvPr id="16" name="Picture 15"/>
+          <p:cNvPicPr>
+            <a:picLocks noChangeAspect="1"/>
+          </p:cNvPicPr>
+          <p:nvPr/>
+        </p:nvPicPr>
+        <p:blipFill>
+          <a:blip r:embed="rId4"/>
+          <a:stretch>
+            <a:fillRect/>
+          </a:stretch>
+        </p:blipFill>
+        <p:spPr>
+          <a:xfrm>
+            <a:off x="462563" y="2510320"/>
+            <a:ext cx="3869945" cy="3177313"/>
+          </a:xfrm>
+          <a:prstGeom prst="rect">
+            <a:avLst/>
+          </a:prstGeom>
+        </p:spPr>
+      </p:pic>
+      <p:grpSp>
+        <p:nvGrpSpPr>
+          <p:cNvPr id="25" name="Group 24"/>
+          <p:cNvGrpSpPr/>
+          <p:nvPr/>
+        </p:nvGrpSpPr>
+        <p:grpSpPr>
+          <a:xfrm>
+            <a:off x="940448" y="4738933"/>
+            <a:ext cx="10039085" cy="1573999"/>
+            <a:chOff x="940448" y="4738933"/>
+            <a:chExt cx="10039085" cy="1573999"/>
+          </a:xfrm>
+        </p:grpSpPr>
+        <p:sp>
+          <p:nvSpPr>
+            <p:cNvPr id="7" name="TextBox 6"/>
+            <p:cNvSpPr txBox="1"/>
+            <p:nvPr/>
+          </p:nvSpPr>
+          <p:spPr>
+            <a:xfrm>
+              <a:off x="7771732" y="5943600"/>
+              <a:ext cx="3207801" cy="369332"/>
+            </a:xfrm>
+            <a:prstGeom prst="rect">
+              <a:avLst/>
+            </a:prstGeom>
+            <a:noFill/>
+          </p:spPr>
+          <p:txBody>
+            <a:bodyPr wrap="none" rtlCol="0">
+              <a:spAutoFit/>
+            </a:bodyPr>
+            <a:lstStyle/>
+            <a:p>
+              <a:r>
+                <a:rPr lang="en-US" dirty="0"/>
+                <a:t>What are  these outliers due to?</a:t>
+              </a:r>
+            </a:p>
+          </p:txBody>
+        </p:sp>
+        <p:sp>
+          <p:nvSpPr>
+            <p:cNvPr id="11" name="Oval 10"/>
+            <p:cNvSpPr/>
+            <p:nvPr/>
+          </p:nvSpPr>
+          <p:spPr>
+            <a:xfrm>
+              <a:off x="5107021" y="4834647"/>
+              <a:ext cx="1352145" cy="243191"/>
+            </a:xfrm>
+            <a:prstGeom prst="ellipse">
+              <a:avLst/>
+            </a:prstGeom>
+            <a:noFill/>
+            <a:ln w="38100">
+              <a:solidFill>
+                <a:srgbClr val="FF0000"/>
+              </a:solidFill>
+            </a:ln>
+          </p:spPr>
+          <p:style>
+            <a:lnRef idx="2">
+              <a:schemeClr val="accent1">
+                <a:shade val="50000"/>
+              </a:schemeClr>
+            </a:lnRef>
+            <a:fillRef idx="1">
+              <a:schemeClr val="accent1"/>
+            </a:fillRef>
+            <a:effectRef idx="0">
+              <a:schemeClr val="accent1"/>
+            </a:effectRef>
+            <a:fontRef idx="minor">
+              <a:schemeClr val="lt1"/>
+            </a:fontRef>
+          </p:style>
+          <p:txBody>
+            <a:bodyPr rtlCol="0" anchor="ctr"/>
+            <a:lstStyle/>
+            <a:p>
+              <a:pPr algn="ctr"/>
+              <a:endParaRPr lang="en-US"/>
+            </a:p>
+          </p:txBody>
+        </p:sp>
+        <p:cxnSp>
+          <p:nvCxnSpPr>
+            <p:cNvPr id="13" name="Straight Arrow Connector 12"/>
+            <p:cNvCxnSpPr/>
+            <p:nvPr/>
+          </p:nvCxnSpPr>
+          <p:spPr>
+            <a:xfrm flipH="1" flipV="1">
+              <a:off x="6238918" y="5077838"/>
+              <a:ext cx="1840751" cy="739302"/>
+            </a:xfrm>
+            <a:prstGeom prst="straightConnector1">
+              <a:avLst/>
+            </a:prstGeom>
+            <a:ln w="38100">
+              <a:solidFill>
+                <a:srgbClr val="FF0000"/>
+              </a:solidFill>
+              <a:tailEnd type="triangle"/>
+            </a:ln>
+          </p:spPr>
+          <p:style>
+            <a:lnRef idx="1">
+              <a:schemeClr val="accent1"/>
+            </a:lnRef>
+            <a:fillRef idx="0">
+              <a:schemeClr val="accent1"/>
+            </a:fillRef>
+            <a:effectRef idx="0">
+              <a:schemeClr val="accent1"/>
+            </a:effectRef>
+            <a:fontRef idx="minor">
+              <a:schemeClr val="tx1"/>
+            </a:fontRef>
+          </p:style>
+        </p:cxnSp>
+        <p:sp>
+          <p:nvSpPr>
+            <p:cNvPr id="14" name="Oval 13"/>
+            <p:cNvSpPr/>
+            <p:nvPr/>
+          </p:nvSpPr>
+          <p:spPr>
+            <a:xfrm rot="20098870">
+              <a:off x="10042955" y="4738933"/>
+              <a:ext cx="710453" cy="191430"/>
+            </a:xfrm>
+            <a:prstGeom prst="ellipse">
+              <a:avLst/>
+            </a:prstGeom>
+            <a:noFill/>
+            <a:ln w="38100">
+              <a:solidFill>
+                <a:srgbClr val="FF0000"/>
+              </a:solidFill>
+            </a:ln>
+          </p:spPr>
+          <p:style>
+            <a:lnRef idx="2">
+              <a:schemeClr val="accent1">
+                <a:shade val="50000"/>
+              </a:schemeClr>
+            </a:lnRef>
+            <a:fillRef idx="1">
+              <a:schemeClr val="accent1"/>
+            </a:fillRef>
+            <a:effectRef idx="0">
+              <a:schemeClr val="accent1"/>
+            </a:effectRef>
+            <a:fontRef idx="minor">
+              <a:schemeClr val="lt1"/>
+            </a:fontRef>
+          </p:style>
+          <p:txBody>
+            <a:bodyPr rtlCol="0" anchor="ctr"/>
+            <a:lstStyle/>
+            <a:p>
+              <a:pPr algn="ctr"/>
+              <a:endParaRPr lang="en-US"/>
+            </a:p>
+          </p:txBody>
+        </p:sp>
+        <p:sp>
+          <p:nvSpPr>
+            <p:cNvPr id="17" name="Oval 16"/>
+            <p:cNvSpPr/>
+            <p:nvPr/>
+          </p:nvSpPr>
+          <p:spPr>
+            <a:xfrm>
+              <a:off x="940448" y="5204167"/>
+              <a:ext cx="547992" cy="243191"/>
+            </a:xfrm>
+            <a:prstGeom prst="ellipse">
+              <a:avLst/>
+            </a:prstGeom>
+            <a:noFill/>
+            <a:ln w="38100">
+              <a:solidFill>
+                <a:srgbClr val="FF0000"/>
+              </a:solidFill>
+            </a:ln>
+          </p:spPr>
+          <p:style>
+            <a:lnRef idx="2">
+              <a:schemeClr val="accent1">
+                <a:shade val="50000"/>
+              </a:schemeClr>
+            </a:lnRef>
+            <a:fillRef idx="1">
+              <a:schemeClr val="accent1"/>
+            </a:fillRef>
+            <a:effectRef idx="0">
+              <a:schemeClr val="accent1"/>
+            </a:effectRef>
+            <a:fontRef idx="minor">
+              <a:schemeClr val="lt1"/>
+            </a:fontRef>
+          </p:style>
+          <p:txBody>
+            <a:bodyPr rtlCol="0" anchor="ctr"/>
+            <a:lstStyle/>
+            <a:p>
+              <a:pPr algn="ctr"/>
+              <a:endParaRPr lang="en-US"/>
+            </a:p>
+          </p:txBody>
+        </p:sp>
+        <p:cxnSp>
+          <p:nvCxnSpPr>
+            <p:cNvPr id="18" name="Straight Arrow Connector 17"/>
+            <p:cNvCxnSpPr/>
+            <p:nvPr/>
+          </p:nvCxnSpPr>
+          <p:spPr>
+            <a:xfrm flipH="1" flipV="1">
+              <a:off x="1660432" y="5447358"/>
+              <a:ext cx="5729591" cy="680908"/>
+            </a:xfrm>
+            <a:prstGeom prst="straightConnector1">
+              <a:avLst/>
+            </a:prstGeom>
+            <a:ln w="38100">
+              <a:solidFill>
+                <a:srgbClr val="FF0000"/>
+              </a:solidFill>
+              <a:tailEnd type="triangle"/>
+            </a:ln>
+          </p:spPr>
+          <p:style>
+            <a:lnRef idx="1">
+              <a:schemeClr val="accent1"/>
+            </a:lnRef>
+            <a:fillRef idx="0">
+              <a:schemeClr val="accent1"/>
+            </a:fillRef>
+            <a:effectRef idx="0">
+              <a:schemeClr val="accent1"/>
+            </a:effectRef>
+            <a:fontRef idx="minor">
+              <a:schemeClr val="tx1"/>
+            </a:fontRef>
+          </p:style>
+        </p:cxnSp>
+        <p:cxnSp>
+          <p:nvCxnSpPr>
+            <p:cNvPr id="21" name="Straight Arrow Connector 20"/>
+            <p:cNvCxnSpPr/>
+            <p:nvPr/>
+          </p:nvCxnSpPr>
+          <p:spPr>
+            <a:xfrm flipV="1">
+              <a:off x="9460851" y="5071614"/>
+              <a:ext cx="583204" cy="871986"/>
+            </a:xfrm>
+            <a:prstGeom prst="straightConnector1">
+              <a:avLst/>
+            </a:prstGeom>
+            <a:ln w="38100">
+              <a:solidFill>
+                <a:srgbClr val="FF0000"/>
+              </a:solidFill>
+              <a:tailEnd type="triangle"/>
+            </a:ln>
+          </p:spPr>
+          <p:style>
+            <a:lnRef idx="1">
+              <a:schemeClr val="accent1"/>
+            </a:lnRef>
+            <a:fillRef idx="0">
+              <a:schemeClr val="accent1"/>
+            </a:fillRef>
+            <a:effectRef idx="0">
+              <a:schemeClr val="accent1"/>
+            </a:effectRef>
+            <a:fontRef idx="minor">
+              <a:schemeClr val="tx1"/>
+            </a:fontRef>
+          </p:style>
+        </p:cxnSp>
+      </p:grpSp>
+    </p:spTree>
+    <p:extLst>
+      <p:ext uri="{BB962C8B-B14F-4D97-AF65-F5344CB8AC3E}">
+        <p14:creationId xmlns:p14="http://schemas.microsoft.com/office/powerpoint/2010/main" val="1259492711"/>
+      </p:ext>
+    </p:extLst>
+  </p:cSld>
+  <p:clrMapOvr>
+    <a:masterClrMapping/>
+  </p:clrMapOvr>
+  <p:timing>
+    <p:tnLst>
+      <p:par>
+        <p:cTn id="1" dur="indefinite" restart="never" nodeType="tmRoot">
+          <p:childTnLst>
+            <p:seq concurrent="1" nextAc="seek">
+              <p:cTn id="2" dur="indefinite" nodeType="mainSeq">
+                <p:childTnLst>
+                  <p:par>
+                    <p:cTn id="3" fill="hold">
+                      <p:stCondLst>
+                        <p:cond delay="indefinite"/>
+                      </p:stCondLst>
+                      <p:childTnLst>
+                        <p:par>
+                          <p:cTn id="4" fill="hold">
+                            <p:stCondLst>
+                              <p:cond delay="0"/>
+                            </p:stCondLst>
+                            <p:childTnLst>
+                              <p:par>
+                                <p:cTn id="5" presetID="1" presetClass="entr" presetSubtype="0" fill="hold" nodeType="clickEffect">
+                                  <p:stCondLst>
+                                    <p:cond delay="0"/>
+                                  </p:stCondLst>
+                                  <p:childTnLst>
+                                    <p:set>
+                                      <p:cBhvr>
+                                        <p:cTn id="6" dur="1" fill="hold">
+                                          <p:stCondLst>
+                                            <p:cond delay="0"/>
+                                          </p:stCondLst>
+                                        </p:cTn>
+                                        <p:tgtEl>
+                                          <p:spTgt spid="25"/>
+                                        </p:tgtEl>
+                                        <p:attrNameLst>
+                                          <p:attrName>style.visibility</p:attrName>
+                                        </p:attrNameLst>
+                                      </p:cBhvr>
+                                      <p:to>
+                                        <p:strVal val="visible"/>
+                                      </p:to>
+                                    </p:set>
+                                  </p:childTnLst>
+                                </p:cTn>
+                              </p:par>
+                            </p:childTnLst>
+                          </p:cTn>
+                        </p:par>
+                      </p:childTnLst>
+                    </p:cTn>
+                  </p:par>
+                </p:childTnLst>
+              </p:cTn>
+              <p:prevCondLst>
+                <p:cond evt="onPrev" delay="0">
+                  <p:tgtEl>
+                    <p:sldTgt/>
+                  </p:tgtEl>
+                </p:cond>
+              </p:prevCondLst>
+              <p:nextCondLst>
+                <p:cond evt="onNext" delay="0">
+                  <p:tgtEl>
+                    <p:sldTgt/>
+                  </p:tgtEl>
+                </p:cond>
+              </p:nextCondLst>
+            </p:seq>
+          </p:childTnLst>
+        </p:cTn>
+      </p:par>
+    </p:tnLst>
+  </p:timing>
 </p:sld>
 </file>
 
@@ -3142,7 +4253,7 @@
           <a:p>
             <a:r>
               <a:rPr lang="en-US" dirty="0"/>
-              <a:t>Goals for the Crash Course</a:t>
+              <a:t>Goals for the REU Crash Course</a:t>
             </a:r>
           </a:p>
         </p:txBody>
@@ -3216,7 +4327,7 @@
           <a:p>
             <a:r>
               <a:rPr lang="en-US" dirty="0"/>
-              <a:t>Learn how to operate in the </a:t>
+              <a:t>Operate in the </a:t>
             </a:r>
             <a:r>
               <a:rPr lang="en-US" dirty="0" err="1"/>
@@ -3237,6 +4348,122 @@
             <a:r>
               <a:rPr lang="en-US" dirty="0"/>
               <a:t>Fit a model to the data and analyze the error</a:t>
+            </a:r>
+          </a:p>
+        </p:txBody>
+      </p:sp>
+      <p:pic>
+        <p:nvPicPr>
+          <p:cNvPr id="4" name="Picture 3"/>
+          <p:cNvPicPr>
+            <a:picLocks noChangeAspect="1"/>
+          </p:cNvPicPr>
+          <p:nvPr/>
+        </p:nvPicPr>
+        <p:blipFill>
+          <a:blip r:embed="rId2"/>
+          <a:stretch>
+            <a:fillRect/>
+          </a:stretch>
+        </p:blipFill>
+        <p:spPr>
+          <a:xfrm>
+            <a:off x="8289267" y="1825625"/>
+            <a:ext cx="2834649" cy="1530209"/>
+          </a:xfrm>
+          <a:prstGeom prst="rect">
+            <a:avLst/>
+          </a:prstGeom>
+          <a:ln>
+            <a:solidFill>
+              <a:schemeClr val="tx1"/>
+            </a:solidFill>
+          </a:ln>
+        </p:spPr>
+      </p:pic>
+      <p:sp>
+        <p:nvSpPr>
+          <p:cNvPr id="5" name="TextBox 4"/>
+          <p:cNvSpPr txBox="1"/>
+          <p:nvPr/>
+        </p:nvSpPr>
+        <p:spPr>
+          <a:xfrm>
+            <a:off x="8289267" y="1434316"/>
+            <a:ext cx="1805494" cy="369332"/>
+          </a:xfrm>
+          <a:prstGeom prst="rect">
+            <a:avLst/>
+          </a:prstGeom>
+          <a:noFill/>
+        </p:spPr>
+        <p:txBody>
+          <a:bodyPr wrap="none" rtlCol="0">
+            <a:spAutoFit/>
+          </a:bodyPr>
+          <a:lstStyle/>
+          <a:p>
+            <a:r>
+              <a:rPr lang="en-US" dirty="0"/>
+              <a:t>Where do I type?</a:t>
+            </a:r>
+          </a:p>
+        </p:txBody>
+      </p:sp>
+      <p:pic>
+        <p:nvPicPr>
+          <p:cNvPr id="6" name="Picture 5"/>
+          <p:cNvPicPr>
+            <a:picLocks noChangeAspect="1"/>
+          </p:cNvPicPr>
+          <p:nvPr/>
+        </p:nvPicPr>
+        <p:blipFill>
+          <a:blip r:embed="rId3"/>
+          <a:stretch>
+            <a:fillRect/>
+          </a:stretch>
+        </p:blipFill>
+        <p:spPr>
+          <a:xfrm>
+            <a:off x="8289267" y="4029121"/>
+            <a:ext cx="2834649" cy="2327311"/>
+          </a:xfrm>
+          <a:prstGeom prst="rect">
+            <a:avLst/>
+          </a:prstGeom>
+          <a:ln w="12700">
+            <a:solidFill>
+              <a:schemeClr val="tx1"/>
+            </a:solidFill>
+          </a:ln>
+        </p:spPr>
+      </p:pic>
+      <p:sp>
+        <p:nvSpPr>
+          <p:cNvPr id="7" name="TextBox 6"/>
+          <p:cNvSpPr txBox="1"/>
+          <p:nvPr/>
+        </p:nvSpPr>
+        <p:spPr>
+          <a:xfrm>
+            <a:off x="8289267" y="3637812"/>
+            <a:ext cx="1272849" cy="369332"/>
+          </a:xfrm>
+          <a:prstGeom prst="rect">
+            <a:avLst/>
+          </a:prstGeom>
+          <a:noFill/>
+        </p:spPr>
+        <p:txBody>
+          <a:bodyPr wrap="none" rtlCol="0">
+            <a:spAutoFit/>
+          </a:bodyPr>
+          <a:lstStyle/>
+          <a:p>
+            <a:r>
+              <a:rPr lang="en-US" dirty="0"/>
+              <a:t>Plot Master</a:t>
             </a:r>
           </a:p>
         </p:txBody>
@@ -3324,73 +4551,46 @@
               <a:buNone/>
             </a:pPr>
             <a:r>
-              <a:rPr lang="en-US" u="sng" dirty="0" err="1"/>
-              <a:t>Matlab</a:t>
-            </a:r>
-            <a:r>
-              <a:rPr lang="en-US" u="sng" dirty="0"/>
-              <a:t> Documentation (online)</a:t>
-            </a:r>
-          </a:p>
-          <a:p>
-            <a:pPr lvl="1"/>
-            <a:r>
-              <a:rPr lang="en-US" dirty="0"/>
-              <a:t>Easiest to find through a Google search of “</a:t>
-            </a:r>
-            <a:r>
-              <a:rPr lang="en-US" dirty="0" err="1"/>
-              <a:t>Matlab</a:t>
-            </a:r>
-            <a:r>
-              <a:rPr lang="en-US" dirty="0"/>
-              <a:t> + command”</a:t>
-            </a:r>
-          </a:p>
-          <a:p>
-            <a:pPr lvl="1"/>
-            <a:r>
-              <a:rPr lang="en-US" dirty="0"/>
-              <a:t>There is example code with an explanation of most commands</a:t>
-            </a:r>
-          </a:p>
-          <a:p>
-            <a:pPr lvl="1"/>
-            <a:r>
-              <a:rPr lang="en-US" dirty="0"/>
-              <a:t>Links to similar commands are listed at the bottom of the page</a:t>
-            </a:r>
-          </a:p>
-          <a:p>
-            <a:pPr marL="0" indent="0">
-              <a:buNone/>
-            </a:pPr>
-            <a:r>
-              <a:rPr lang="en-US" u="sng" dirty="0">
-                <a:hlinkClick r:id="rId2"/>
-              </a:rPr>
-              <a:t>BYU Intro to </a:t>
-            </a:r>
-            <a:r>
               <a:rPr lang="en-US" u="sng" dirty="0" err="1">
                 <a:hlinkClick r:id="rId2"/>
               </a:rPr>
               <a:t>Matlab</a:t>
             </a:r>
+            <a:r>
+              <a:rPr lang="en-US" u="sng" dirty="0">
+                <a:hlinkClick r:id="rId2"/>
+              </a:rPr>
+              <a:t> Documentation</a:t>
+            </a:r>
             <a:endParaRPr lang="en-US" u="sng" dirty="0"/>
           </a:p>
           <a:p>
             <a:pPr lvl="1"/>
             <a:r>
               <a:rPr lang="en-US" dirty="0"/>
-              <a:t>Loosely used as an outline for this crash course</a:t>
+              <a:t>Easiest to find through a Google search of “</a:t>
+            </a:r>
+            <a:r>
+              <a:rPr lang="en-US" dirty="0" err="1"/>
+              <a:t>Matlab</a:t>
+            </a:r>
+            <a:r>
+              <a:rPr lang="en-US" dirty="0"/>
+              <a:t> + command”</a:t>
             </a:r>
           </a:p>
           <a:p>
             <a:pPr lvl="1"/>
             <a:r>
               <a:rPr lang="en-US" dirty="0"/>
-              <a:t>PDF with less explicit cross references than the online material</a:t>
+              <a:t>There is example code with an explanation of most commands</a:t>
+            </a:r>
+          </a:p>
+          <a:p>
+            <a:pPr lvl="1"/>
+            <a:r>
+              <a:rPr lang="en-US" dirty="0"/>
+              <a:t>Links to similar commands are listed at the bottom of the page</a:t>
             </a:r>
           </a:p>
           <a:p>
@@ -3401,6 +4601,38 @@
               <a:rPr lang="en-US" u="sng" dirty="0">
                 <a:hlinkClick r:id="rId3"/>
               </a:rPr>
+              <a:t>BYU Intro to </a:t>
+            </a:r>
+            <a:r>
+              <a:rPr lang="en-US" u="sng" dirty="0" err="1">
+                <a:hlinkClick r:id="rId3"/>
+              </a:rPr>
+              <a:t>Matlab</a:t>
+            </a:r>
+            <a:endParaRPr lang="en-US" u="sng" dirty="0"/>
+          </a:p>
+          <a:p>
+            <a:pPr lvl="1"/>
+            <a:r>
+              <a:rPr lang="en-US" dirty="0"/>
+              <a:t>Loosely used as an outline for this crash course</a:t>
+            </a:r>
+          </a:p>
+          <a:p>
+            <a:pPr lvl="1"/>
+            <a:r>
+              <a:rPr lang="en-US" dirty="0"/>
+              <a:t>PDF with less explicit cross references than the online material</a:t>
+            </a:r>
+          </a:p>
+          <a:p>
+            <a:pPr marL="0" indent="0">
+              <a:buNone/>
+            </a:pPr>
+            <a:r>
+              <a:rPr lang="en-US" u="sng" dirty="0">
+                <a:hlinkClick r:id="rId4"/>
+              </a:rPr>
               <a:t>Weitzman Institute</a:t>
             </a:r>
             <a:endParaRPr lang="en-US" u="sng" dirty="0"/>
@@ -3447,7 +4679,7 @@
             <a:pPr lvl="1"/>
             <a:r>
               <a:rPr lang="en-US" dirty="0"/>
-              <a:t>Has experience fitting data similar to the data you are fitting in your field </a:t>
+              <a:t>Easiest way to find answers about syntax problems or unknown errors</a:t>
             </a:r>
           </a:p>
         </p:txBody>
@@ -3519,9 +4751,16 @@
             <p:ph idx="1"/>
           </p:nvPr>
         </p:nvSpPr>
-        <p:spPr/>
-        <p:txBody>
-          <a:bodyPr/>
+        <p:spPr>
+          <a:xfrm>
+            <a:off x="463843" y="1690688"/>
+            <a:ext cx="10515600" cy="4351338"/>
+          </a:xfrm>
+        </p:spPr>
+        <p:txBody>
+          <a:bodyPr>
+            <a:normAutofit lnSpcReduction="10000"/>
+          </a:bodyPr>
           <a:lstStyle/>
           <a:p>
             <a:r>
@@ -3534,6 +4773,21 @@
             <a:r>
               <a:rPr lang="en-US" dirty="0"/>
               <a:t>Saving, Running, Changing Preferences</a:t>
+            </a:r>
+          </a:p>
+          <a:p>
+            <a:pPr lvl="1"/>
+            <a:r>
+              <a:rPr lang="en-US" dirty="0"/>
+              <a:t>This is also </a:t>
+            </a:r>
+            <a:r>
+              <a:rPr lang="en-US" dirty="0" err="1"/>
+              <a:t>wthe</a:t>
+            </a:r>
+            <a:r>
+              <a:rPr lang="en-US" dirty="0"/>
+              <a:t> GUI for plots and apps</a:t>
             </a:r>
           </a:p>
           <a:p>
@@ -3985,21 +5239,22 @@
       </p:sp>
       <p:pic>
         <p:nvPicPr>
-          <p:cNvPr id="4" name="Picture 3"/>
+          <p:cNvPr id="9" name="Picture 8"/>
           <p:cNvPicPr>
             <a:picLocks noChangeAspect="1"/>
           </p:cNvPicPr>
           <p:nvPr/>
         </p:nvPicPr>
-        <p:blipFill rotWithShape="1">
+        <p:blipFill>
           <a:blip r:embed="rId2"/>
-          <a:srcRect b="29673"/>
-          <a:stretch/>
+          <a:stretch>
+            <a:fillRect/>
+          </a:stretch>
         </p:blipFill>
         <p:spPr>
           <a:xfrm>
-            <a:off x="10042751" y="1433103"/>
-            <a:ext cx="1413354" cy="1094981"/>
+            <a:off x="5214212" y="2902059"/>
+            <a:ext cx="3737160" cy="917762"/>
           </a:xfrm>
           <a:prstGeom prst="rect">
             <a:avLst/>
@@ -4013,7 +5268,7 @@
       </p:pic>
       <p:pic>
         <p:nvPicPr>
-          <p:cNvPr id="5" name="Picture 4"/>
+          <p:cNvPr id="11" name="Picture 10"/>
           <p:cNvPicPr>
             <a:picLocks noChangeAspect="1"/>
           </p:cNvPicPr>
@@ -4021,18 +5276,18 @@
         </p:nvPicPr>
         <p:blipFill rotWithShape="1">
           <a:blip r:embed="rId3"/>
-          <a:srcRect b="37551"/>
+          <a:srcRect l="2511"/>
           <a:stretch/>
         </p:blipFill>
         <p:spPr>
           <a:xfrm>
-            <a:off x="8186871" y="458557"/>
-            <a:ext cx="2124381" cy="482418"/>
+            <a:off x="9486660" y="6057417"/>
+            <a:ext cx="1760434" cy="455664"/>
           </a:xfrm>
           <a:prstGeom prst="rect">
             <a:avLst/>
           </a:prstGeom>
-          <a:ln>
+          <a:ln w="12700">
             <a:solidFill>
               <a:schemeClr val="tx1"/>
             </a:solidFill>
@@ -4041,7 +5296,7 @@
       </p:pic>
       <p:pic>
         <p:nvPicPr>
-          <p:cNvPr id="6" name="Picture 5"/>
+          <p:cNvPr id="16" name="Picture 15"/>
           <p:cNvPicPr>
             <a:picLocks noChangeAspect="1"/>
           </p:cNvPicPr>
@@ -4055,13 +5310,13 @@
         </p:blipFill>
         <p:spPr>
           <a:xfrm>
-            <a:off x="10868170" y="338107"/>
-            <a:ext cx="1006903" cy="899370"/>
+            <a:off x="8333893" y="631150"/>
+            <a:ext cx="2171700" cy="438150"/>
           </a:xfrm>
           <a:prstGeom prst="rect">
             <a:avLst/>
           </a:prstGeom>
-          <a:ln>
+          <a:ln w="12700">
             <a:solidFill>
               <a:schemeClr val="tx1"/>
             </a:solidFill>
@@ -4070,26 +5325,27 @@
       </p:pic>
       <p:pic>
         <p:nvPicPr>
-          <p:cNvPr id="7" name="Picture 6"/>
+          <p:cNvPr id="17" name="Picture 16"/>
           <p:cNvPicPr>
             <a:picLocks noChangeAspect="1"/>
           </p:cNvPicPr>
           <p:nvPr/>
         </p:nvPicPr>
-        <p:blipFill rotWithShape="1">
+        <p:blipFill>
           <a:blip r:embed="rId5"/>
-          <a:srcRect l="2703"/>
-          <a:stretch/>
+          <a:stretch>
+            <a:fillRect/>
+          </a:stretch>
         </p:blipFill>
         <p:spPr>
           <a:xfrm>
-            <a:off x="5093294" y="1654877"/>
-            <a:ext cx="1769202" cy="770562"/>
+            <a:off x="10108794" y="1410773"/>
+            <a:ext cx="1333500" cy="1123950"/>
           </a:xfrm>
           <a:prstGeom prst="rect">
             <a:avLst/>
           </a:prstGeom>
-          <a:ln>
+          <a:ln w="12700">
             <a:solidFill>
               <a:schemeClr val="tx1"/>
             </a:solidFill>
@@ -4098,7 +5354,7 @@
       </p:pic>
       <p:pic>
         <p:nvPicPr>
-          <p:cNvPr id="8" name="Picture 7"/>
+          <p:cNvPr id="18" name="Picture 17"/>
           <p:cNvPicPr>
             <a:picLocks noChangeAspect="1"/>
           </p:cNvPicPr>
@@ -4112,13 +5368,13 @@
         </p:blipFill>
         <p:spPr>
           <a:xfrm>
-            <a:off x="7401349" y="1556446"/>
-            <a:ext cx="2210239" cy="875885"/>
+            <a:off x="11084498" y="212669"/>
+            <a:ext cx="790575" cy="1104900"/>
           </a:xfrm>
           <a:prstGeom prst="rect">
             <a:avLst/>
           </a:prstGeom>
-          <a:ln>
+          <a:ln w="12700">
             <a:solidFill>
               <a:schemeClr val="tx1"/>
             </a:solidFill>
@@ -4127,7 +5383,7 @@
       </p:pic>
       <p:pic>
         <p:nvPicPr>
-          <p:cNvPr id="9" name="Picture 8"/>
+          <p:cNvPr id="19" name="Picture 18"/>
           <p:cNvPicPr>
             <a:picLocks noChangeAspect="1"/>
           </p:cNvPicPr>
@@ -4141,13 +5397,13 @@
         </p:blipFill>
         <p:spPr>
           <a:xfrm>
-            <a:off x="5682583" y="2906343"/>
-            <a:ext cx="3737160" cy="917762"/>
+            <a:off x="4472942" y="1388253"/>
+            <a:ext cx="2609850" cy="1200150"/>
           </a:xfrm>
           <a:prstGeom prst="rect">
             <a:avLst/>
           </a:prstGeom>
-          <a:ln>
+          <a:ln w="12700">
             <a:solidFill>
               <a:schemeClr val="tx1"/>
             </a:solidFill>
@@ -4156,7 +5412,7 @@
       </p:pic>
       <p:pic>
         <p:nvPicPr>
-          <p:cNvPr id="10" name="Picture 9"/>
+          <p:cNvPr id="20" name="Picture 19"/>
           <p:cNvPicPr>
             <a:picLocks noChangeAspect="1"/>
           </p:cNvPicPr>
@@ -4170,13 +5426,13 @@
         </p:blipFill>
         <p:spPr>
           <a:xfrm>
-            <a:off x="9797920" y="2839953"/>
-            <a:ext cx="1251711" cy="1050543"/>
+            <a:off x="7390200" y="1329057"/>
+            <a:ext cx="2450043" cy="1196860"/>
           </a:xfrm>
           <a:prstGeom prst="rect">
             <a:avLst/>
           </a:prstGeom>
-          <a:ln>
+          <a:ln w="12700">
             <a:solidFill>
               <a:schemeClr val="tx1"/>
             </a:solidFill>
@@ -4185,26 +5441,27 @@
       </p:pic>
       <p:pic>
         <p:nvPicPr>
-          <p:cNvPr id="11" name="Picture 10"/>
+          <p:cNvPr id="22" name="Picture 21"/>
           <p:cNvPicPr>
             <a:picLocks noChangeAspect="1"/>
           </p:cNvPicPr>
           <p:nvPr/>
         </p:nvPicPr>
-        <p:blipFill rotWithShape="1">
+        <p:blipFill>
           <a:blip r:embed="rId9"/>
-          <a:srcRect l="2511"/>
-          <a:stretch/>
+          <a:stretch>
+            <a:fillRect/>
+          </a:stretch>
         </p:blipFill>
         <p:spPr>
           <a:xfrm>
-            <a:off x="9431035" y="5890840"/>
-            <a:ext cx="1760434" cy="455664"/>
+            <a:off x="10001454" y="2955117"/>
+            <a:ext cx="1181100" cy="1209675"/>
           </a:xfrm>
           <a:prstGeom prst="rect">
             <a:avLst/>
           </a:prstGeom>
-          <a:ln>
+          <a:ln w="12700">
             <a:solidFill>
               <a:schemeClr val="tx1"/>
             </a:solidFill>
@@ -4213,7 +5470,7 @@
       </p:pic>
       <p:pic>
         <p:nvPicPr>
-          <p:cNvPr id="12" name="Picture 11"/>
+          <p:cNvPr id="23" name="Picture 22"/>
           <p:cNvPicPr>
             <a:picLocks noChangeAspect="1"/>
           </p:cNvPicPr>
@@ -4227,13 +5484,13 @@
         </p:blipFill>
         <p:spPr>
           <a:xfrm>
-            <a:off x="6687679" y="4184159"/>
-            <a:ext cx="1170551" cy="904728"/>
+            <a:off x="6513638" y="3973707"/>
+            <a:ext cx="889085" cy="1041500"/>
           </a:xfrm>
           <a:prstGeom prst="rect">
             <a:avLst/>
           </a:prstGeom>
-          <a:ln>
+          <a:ln w="12700">
             <a:solidFill>
               <a:schemeClr val="tx1"/>
             </a:solidFill>
@@ -4242,7 +5499,7 @@
       </p:pic>
       <p:pic>
         <p:nvPicPr>
-          <p:cNvPr id="13" name="Picture 12"/>
+          <p:cNvPr id="24" name="Picture 23"/>
           <p:cNvPicPr>
             <a:picLocks noChangeAspect="1"/>
           </p:cNvPicPr>
@@ -4256,13 +5513,13 @@
         </p:blipFill>
         <p:spPr>
           <a:xfrm>
-            <a:off x="7980764" y="4184315"/>
-            <a:ext cx="1917504" cy="904572"/>
+            <a:off x="7699560" y="4044407"/>
+            <a:ext cx="1907629" cy="911423"/>
           </a:xfrm>
           <a:prstGeom prst="rect">
             <a:avLst/>
           </a:prstGeom>
-          <a:ln>
+          <a:ln w="12700">
             <a:solidFill>
               <a:schemeClr val="tx1"/>
             </a:solidFill>
@@ -4271,7 +5528,7 @@
       </p:pic>
       <p:pic>
         <p:nvPicPr>
-          <p:cNvPr id="14" name="Picture 13"/>
+          <p:cNvPr id="25" name="Picture 24"/>
           <p:cNvPicPr>
             <a:picLocks noChangeAspect="1"/>
           </p:cNvPicPr>
@@ -4285,19 +5542,55 @@
         </p:blipFill>
         <p:spPr>
           <a:xfrm>
-            <a:off x="10158537" y="4263398"/>
-            <a:ext cx="1716536" cy="1210378"/>
+            <a:off x="9904026" y="4494457"/>
+            <a:ext cx="2013228" cy="1414498"/>
           </a:xfrm>
           <a:prstGeom prst="rect">
             <a:avLst/>
           </a:prstGeom>
-          <a:ln>
+          <a:ln w="12700">
             <a:solidFill>
               <a:schemeClr val="tx1"/>
             </a:solidFill>
           </a:ln>
         </p:spPr>
       </p:pic>
+      <p:sp>
+        <p:nvSpPr>
+          <p:cNvPr id="26" name="Rectangle 25"/>
+          <p:cNvSpPr/>
+          <p:nvPr/>
+        </p:nvSpPr>
+        <p:spPr>
+          <a:xfrm>
+            <a:off x="5221797" y="5942496"/>
+            <a:ext cx="3965399" cy="738664"/>
+          </a:xfrm>
+          <a:prstGeom prst="rect">
+            <a:avLst/>
+          </a:prstGeom>
+        </p:spPr>
+        <p:txBody>
+          <a:bodyPr wrap="square">
+            <a:spAutoFit/>
+          </a:bodyPr>
+          <a:lstStyle/>
+          <a:p>
+            <a:r>
+              <a:rPr lang="en-US" sz="1400" dirty="0"/>
+              <a:t>When you do not specify an output variable, MATLAB uses the variable </a:t>
+            </a:r>
+            <a:r>
+              <a:rPr lang="en-US" sz="1400" dirty="0" err="1"/>
+              <a:t>ans</a:t>
+            </a:r>
+            <a:r>
+              <a:rPr lang="en-US" sz="1400" dirty="0"/>
+              <a:t>, short for answer, to store the results of your calculation.</a:t>
+            </a:r>
+          </a:p>
+        </p:txBody>
+      </p:sp>
     </p:spTree>
     <p:extLst>
       <p:ext uri="{BB962C8B-B14F-4D97-AF65-F5344CB8AC3E}">
@@ -4362,13 +5655,13 @@
         </p:nvSpPr>
         <p:spPr>
           <a:xfrm>
-            <a:off x="2410627" y="3317962"/>
-            <a:ext cx="7545937" cy="2956846"/>
+            <a:off x="3034014" y="3911124"/>
+            <a:ext cx="6639953" cy="2128363"/>
           </a:xfrm>
         </p:spPr>
         <p:txBody>
           <a:bodyPr>
-            <a:normAutofit fontScale="70000" lnSpcReduction="20000"/>
+            <a:normAutofit fontScale="55000" lnSpcReduction="20000"/>
           </a:bodyPr>
           <a:lstStyle/>
           <a:p>
@@ -4376,7 +5669,7 @@
               <a:buNone/>
             </a:pPr>
             <a:r>
-              <a:rPr lang="en-US" dirty="0"/>
+              <a:rPr lang="en-US" u="sng" dirty="0"/>
               <a:t>Some notes about file names</a:t>
             </a:r>
           </a:p>
@@ -4396,14 +5689,8 @@
             <a:pPr marL="0" indent="0">
               <a:buNone/>
             </a:pPr>
-            <a:endParaRPr lang="en-US" dirty="0"/>
-          </a:p>
-          <a:p>
-            <a:pPr marL="0" indent="0">
-              <a:buNone/>
-            </a:pPr>
-            <a:r>
-              <a:rPr lang="en-US" dirty="0"/>
+            <a:r>
+              <a:rPr lang="en-US" u="sng" dirty="0"/>
               <a:t>Some notes about Variable Names</a:t>
             </a:r>
           </a:p>
@@ -4442,7 +5729,7 @@
         </p:blipFill>
         <p:spPr>
           <a:xfrm>
-            <a:off x="838200" y="1690688"/>
+            <a:off x="570002" y="2337019"/>
             <a:ext cx="1572427" cy="3974460"/>
           </a:xfrm>
           <a:prstGeom prst="rect">
@@ -4453,13 +5740,15 @@
       <p:cxnSp>
         <p:nvCxnSpPr>
           <p:cNvPr id="6" name="Straight Arrow Connector 5"/>
-          <p:cNvCxnSpPr/>
+          <p:cNvCxnSpPr>
+            <a:stCxn id="13" idx="2"/>
+          </p:cNvCxnSpPr>
           <p:nvPr/>
         </p:nvCxnSpPr>
         <p:spPr>
           <a:xfrm>
-            <a:off x="261715" y="2743199"/>
-            <a:ext cx="1152970" cy="0"/>
+            <a:off x="1071944" y="2117265"/>
+            <a:ext cx="74543" cy="1272265"/>
           </a:xfrm>
           <a:prstGeom prst="straightConnector1">
             <a:avLst/>
@@ -4495,8 +5784,8 @@
         </p:nvSpPr>
         <p:spPr>
           <a:xfrm>
-            <a:off x="2717562" y="1494732"/>
-            <a:ext cx="6096000" cy="1200329"/>
+            <a:off x="2486693" y="2670722"/>
+            <a:ext cx="6096000" cy="923330"/>
           </a:xfrm>
           <a:prstGeom prst="rect">
             <a:avLst/>
@@ -4510,7 +5799,7 @@
           <a:p>
             <a:r>
               <a:rPr lang="en-US" b="1" i="1" dirty="0"/>
-              <a:t>Try to write a program that will create a variable but not output it yet, and print the phrase “Hello World” in the command window.  Then the program should print the value of the variable squared.</a:t>
+              <a:t>Try to write a program that will create a variable but not output it yet, print the phrase “Hello World” in the command window and then print the value of the variable squared.</a:t>
             </a:r>
           </a:p>
         </p:txBody>
@@ -4523,7 +5812,7 @@
         </p:nvSpPr>
         <p:spPr>
           <a:xfrm>
-            <a:off x="8979136" y="1990554"/>
+            <a:off x="9116233" y="3283213"/>
             <a:ext cx="2951148" cy="923330"/>
           </a:xfrm>
           <a:prstGeom prst="rect">
@@ -4558,7 +5847,7 @@
         </p:blipFill>
         <p:spPr>
           <a:xfrm>
-            <a:off x="9041165" y="3539855"/>
+            <a:off x="9078699" y="4978376"/>
             <a:ext cx="2827091" cy="988620"/>
           </a:xfrm>
           <a:prstGeom prst="rect">
@@ -4574,8 +5863,8 @@
         </p:nvCxnSpPr>
         <p:spPr>
           <a:xfrm flipH="1">
-            <a:off x="9395670" y="2913884"/>
-            <a:ext cx="486562" cy="622901"/>
+            <a:off x="9433204" y="4259458"/>
+            <a:ext cx="636105" cy="715848"/>
           </a:xfrm>
           <a:prstGeom prst="straightConnector1">
             <a:avLst/>
@@ -4603,6 +5892,72 @@
           </a:fontRef>
         </p:style>
       </p:cxnSp>
+      <p:sp>
+        <p:nvSpPr>
+          <p:cNvPr id="5" name="TextBox 4"/>
+          <p:cNvSpPr txBox="1"/>
+          <p:nvPr/>
+        </p:nvSpPr>
+        <p:spPr>
+          <a:xfrm>
+            <a:off x="2611160" y="1528180"/>
+            <a:ext cx="9244582" cy="923330"/>
+          </a:xfrm>
+          <a:prstGeom prst="rect">
+            <a:avLst/>
+          </a:prstGeom>
+          <a:noFill/>
+        </p:spPr>
+        <p:txBody>
+          <a:bodyPr wrap="square" rtlCol="0">
+            <a:spAutoFit/>
+          </a:bodyPr>
+          <a:lstStyle/>
+          <a:p>
+            <a:r>
+              <a:rPr lang="en-US" dirty="0"/>
+              <a:t>You can write </a:t>
+            </a:r>
+            <a:r>
+              <a:rPr lang="en-US" dirty="0" err="1"/>
+              <a:t>Matlab</a:t>
+            </a:r>
+            <a:r>
+              <a:rPr lang="en-US" dirty="0"/>
+              <a:t> code into a file and save it as a .m file.  This makes it easier to write and debut larger programs without using the command line.  The interface in the script editor also makes it easier to write clean and functional code.</a:t>
+            </a:r>
+          </a:p>
+        </p:txBody>
+      </p:sp>
+      <p:sp>
+        <p:nvSpPr>
+          <p:cNvPr id="13" name="TextBox 12"/>
+          <p:cNvSpPr txBox="1"/>
+          <p:nvPr/>
+        </p:nvSpPr>
+        <p:spPr>
+          <a:xfrm>
+            <a:off x="1458" y="1747933"/>
+            <a:ext cx="2140971" cy="369332"/>
+          </a:xfrm>
+          <a:prstGeom prst="rect">
+            <a:avLst/>
+          </a:prstGeom>
+          <a:noFill/>
+        </p:spPr>
+        <p:txBody>
+          <a:bodyPr wrap="none" rtlCol="0">
+            <a:spAutoFit/>
+          </a:bodyPr>
+          <a:lstStyle/>
+          <a:p>
+            <a:r>
+              <a:rPr lang="en-US" dirty="0"/>
+              <a:t>Open a new file here</a:t>
+            </a:r>
+          </a:p>
+        </p:txBody>
+      </p:sp>
     </p:spTree>
     <p:extLst>
       <p:ext uri="{BB962C8B-B14F-4D97-AF65-F5344CB8AC3E}">
@@ -4735,7 +6090,7 @@
         </p:nvSpPr>
         <p:spPr>
           <a:xfrm>
-            <a:off x="4997095" y="5595416"/>
+            <a:off x="5152738" y="5753208"/>
             <a:ext cx="6495822" cy="646331"/>
           </a:xfrm>
           <a:prstGeom prst="rect">
@@ -4750,14 +6105,14 @@
           <a:p>
             <a:r>
               <a:rPr lang="en-US" b="1" i="1" dirty="0"/>
-              <a:t>Try to write a program that sums the first 100 integers using a for loop.  Can you make it only count the 10s between 0 and 100?</a:t>
+              <a:t>Try to write a program that sums the first 100 integers using a for loop.  Can you make it only count the 10s from 1 to 100?</a:t>
             </a:r>
           </a:p>
         </p:txBody>
       </p:sp>
       <p:pic>
         <p:nvPicPr>
-          <p:cNvPr id="5" name="Picture 4"/>
+          <p:cNvPr id="8" name="Picture 7"/>
           <p:cNvPicPr>
             <a:picLocks noChangeAspect="1"/>
           </p:cNvPicPr>
@@ -4771,8 +6126,8 @@
         </p:blipFill>
         <p:spPr>
           <a:xfrm>
-            <a:off x="1807505" y="2340540"/>
-            <a:ext cx="6437501" cy="842115"/>
+            <a:off x="1796409" y="4446165"/>
+            <a:ext cx="7410450" cy="1095375"/>
           </a:xfrm>
           <a:prstGeom prst="rect">
             <a:avLst/>
@@ -4781,7 +6136,7 @@
       </p:pic>
       <p:pic>
         <p:nvPicPr>
-          <p:cNvPr id="6" name="Picture 5"/>
+          <p:cNvPr id="9" name="Picture 8"/>
           <p:cNvPicPr>
             <a:picLocks noChangeAspect="1"/>
           </p:cNvPicPr>
@@ -4795,8 +6150,8 @@
         </p:blipFill>
         <p:spPr>
           <a:xfrm>
-            <a:off x="1807505" y="4434702"/>
-            <a:ext cx="6229148" cy="1060281"/>
+            <a:off x="1796409" y="2450360"/>
+            <a:ext cx="7439025" cy="847725"/>
           </a:xfrm>
           <a:prstGeom prst="rect">
             <a:avLst/>
@@ -4845,7 +6200,7 @@
         </p:nvSpPr>
         <p:spPr>
           <a:xfrm>
-            <a:off x="167080" y="-47048"/>
+            <a:off x="167080" y="-297409"/>
             <a:ext cx="10515600" cy="1325563"/>
           </a:xfrm>
         </p:spPr>
@@ -4872,13 +6227,13 @@
         </p:nvSpPr>
         <p:spPr>
           <a:xfrm>
-            <a:off x="771088" y="1578705"/>
-            <a:ext cx="6233719" cy="4159365"/>
+            <a:off x="167080" y="1363581"/>
+            <a:ext cx="7058427" cy="1899864"/>
           </a:xfrm>
         </p:spPr>
         <p:txBody>
           <a:bodyPr>
-            <a:normAutofit fontScale="77500" lnSpcReduction="20000"/>
+            <a:normAutofit/>
           </a:bodyPr>
           <a:lstStyle/>
           <a:p>
@@ -4887,30 +6242,36 @@
             </a:pPr>
             <a:r>
               <a:rPr lang="en-US" dirty="0"/>
-              <a:t>In Code plotting</a:t>
-            </a:r>
-          </a:p>
-          <a:p>
-            <a:r>
-              <a:rPr lang="en-US" dirty="0"/>
-              <a:t>Create the figure</a:t>
-            </a:r>
-          </a:p>
-          <a:p>
-            <a:r>
-              <a:rPr lang="en-US" dirty="0"/>
-              <a:t>Plot the variables that are the same length</a:t>
-            </a:r>
-          </a:p>
-          <a:p>
-            <a:r>
-              <a:rPr lang="en-US" dirty="0"/>
-              <a:t>Add formatting after the second variable </a:t>
-            </a:r>
-          </a:p>
-          <a:p>
-            <a:r>
-              <a:rPr lang="en-US" dirty="0"/>
+              <a:t>In Code plotting Order</a:t>
+            </a:r>
+          </a:p>
+          <a:p>
+            <a:pPr marL="514350" indent="-514350">
+              <a:buFont typeface="+mj-lt"/>
+              <a:buAutoNum type="arabicPeriod"/>
+            </a:pPr>
+            <a:r>
+              <a:rPr lang="en-US" sz="2000" dirty="0"/>
+              <a:t>Plot two variables that are the same length</a:t>
+            </a:r>
+          </a:p>
+          <a:p>
+            <a:pPr marL="514350" indent="-514350">
+              <a:buFont typeface="+mj-lt"/>
+              <a:buAutoNum type="arabicPeriod"/>
+            </a:pPr>
+            <a:r>
+              <a:rPr lang="en-US" sz="2000" dirty="0"/>
+              <a:t>Add formatting after the second variable  if you want</a:t>
+            </a:r>
+          </a:p>
+          <a:p>
+            <a:pPr marL="514350" indent="-514350">
+              <a:buFont typeface="+mj-lt"/>
+              <a:buAutoNum type="arabicPeriod"/>
+            </a:pPr>
+            <a:r>
+              <a:rPr lang="en-US" sz="2000" dirty="0"/>
               <a:t>Add labels and a title in the next line</a:t>
             </a:r>
           </a:p>
@@ -4919,39 +6280,6 @@
               <a:buNone/>
             </a:pPr>
             <a:endParaRPr lang="en-US" dirty="0"/>
-          </a:p>
-          <a:p>
-            <a:pPr marL="0" indent="0">
-              <a:buNone/>
-            </a:pPr>
-            <a:r>
-              <a:rPr lang="en-US" dirty="0"/>
-              <a:t>Using the GUI to plot graphs</a:t>
-            </a:r>
-          </a:p>
-          <a:p>
-            <a:r>
-              <a:rPr lang="en-US" dirty="0"/>
-              <a:t>Select the variable you want to plot</a:t>
-            </a:r>
-          </a:p>
-          <a:p>
-            <a:r>
-              <a:rPr lang="en-US" dirty="0"/>
-              <a:t>Click on the type of plot you want to use</a:t>
-            </a:r>
-          </a:p>
-          <a:p>
-            <a:r>
-              <a:rPr lang="en-US" dirty="0"/>
-              <a:t>Open Plot Tools and Dock Figure</a:t>
-            </a:r>
-          </a:p>
-          <a:p>
-            <a:r>
-              <a:rPr lang="en-US" dirty="0"/>
-              <a:t>Adjust the range and setup using the toolbar</a:t>
-            </a:r>
           </a:p>
         </p:txBody>
       </p:sp>
@@ -4963,8 +6291,8 @@
         </p:nvSpPr>
         <p:spPr>
           <a:xfrm>
-            <a:off x="6325300" y="5352368"/>
-            <a:ext cx="5559376" cy="923330"/>
+            <a:off x="216506" y="3440712"/>
+            <a:ext cx="6658427" cy="2308324"/>
           </a:xfrm>
           <a:prstGeom prst="rect">
             <a:avLst/>
@@ -4978,7 +6306,30 @@
           <a:p>
             <a:r>
               <a:rPr lang="en-US" b="1" i="1" dirty="0"/>
-              <a:t>Try to write a program that plots a sine function on a 2D plot with 500 points in the plot with Title and axis labels.  Then try and replicate the graph using the GUI.</a:t>
+              <a:t>Try to write a program that makes two vectors of equal length (theta, sine) that are 100 points long and are the first 3 periods of a sine function.  </a:t>
+            </a:r>
+          </a:p>
+          <a:p>
+            <a:endParaRPr lang="en-US" b="1" i="1" dirty="0"/>
+          </a:p>
+          <a:p>
+            <a:r>
+              <a:rPr lang="en-US" b="1" i="1" dirty="0"/>
+              <a:t>Then try to plot them on a 2D plot.  It should include axis labels and </a:t>
+            </a:r>
+            <a:r>
+              <a:rPr lang="en-US" b="1" i="1" dirty="0"/>
+              <a:t>a title like in the examples (on the right)</a:t>
+            </a:r>
+            <a:endParaRPr lang="en-US" b="1" i="1" dirty="0"/>
+          </a:p>
+          <a:p>
+            <a:endParaRPr lang="en-US" b="1" i="1" dirty="0"/>
+          </a:p>
+          <a:p>
+            <a:r>
+              <a:rPr lang="en-US" b="1" i="1" dirty="0"/>
+              <a:t>Try to change the line to red. Try to change the line to black dots.</a:t>
             </a:r>
           </a:p>
         </p:txBody>
@@ -4999,7 +6350,7 @@
         </p:blipFill>
         <p:spPr>
           <a:xfrm>
-            <a:off x="5020171" y="1508682"/>
+            <a:off x="4973517" y="652278"/>
             <a:ext cx="7021371" cy="1087180"/>
           </a:xfrm>
           <a:prstGeom prst="rect">
@@ -5009,53 +6360,65 @@
       </p:pic>
       <p:pic>
         <p:nvPicPr>
-          <p:cNvPr id="7" name="Picture 6"/>
+          <p:cNvPr id="12" name="Picture 11"/>
           <p:cNvPicPr>
             <a:picLocks noChangeAspect="1"/>
           </p:cNvPicPr>
           <p:nvPr/>
         </p:nvPicPr>
-        <p:blipFill rotWithShape="1">
+        <p:blipFill>
           <a:blip r:embed="rId3"/>
-          <a:srcRect r="18527"/>
-          <a:stretch/>
+          <a:stretch>
+            <a:fillRect/>
+          </a:stretch>
         </p:blipFill>
         <p:spPr>
           <a:xfrm>
-            <a:off x="9323818" y="3333781"/>
-            <a:ext cx="2717724" cy="699546"/>
+            <a:off x="8105539" y="2161121"/>
+            <a:ext cx="2682787" cy="2012090"/>
           </a:xfrm>
           <a:prstGeom prst="rect">
             <a:avLst/>
           </a:prstGeom>
+          <a:ln w="12700">
+            <a:solidFill>
+              <a:schemeClr val="tx1"/>
+            </a:solidFill>
+          </a:ln>
         </p:spPr>
       </p:pic>
       <p:pic>
         <p:nvPicPr>
-          <p:cNvPr id="8" name="Picture 7"/>
+          <p:cNvPr id="13" name="Picture 12"/>
           <p:cNvPicPr>
             <a:picLocks noChangeAspect="1"/>
           </p:cNvPicPr>
           <p:nvPr/>
         </p:nvPicPr>
-        <p:blipFill rotWithShape="1">
+        <p:blipFill>
           <a:blip r:embed="rId4"/>
-          <a:srcRect r="33135"/>
-          <a:stretch/>
+          <a:stretch>
+            <a:fillRect/>
+          </a:stretch>
         </p:blipFill>
         <p:spPr>
           <a:xfrm>
-            <a:off x="6615899" y="3398102"/>
-            <a:ext cx="2421839" cy="699546"/>
+            <a:off x="7167702" y="4594874"/>
+            <a:ext cx="2218570" cy="1663928"/>
           </a:xfrm>
           <a:prstGeom prst="rect">
             <a:avLst/>
           </a:prstGeom>
+          <a:ln w="12700">
+            <a:solidFill>
+              <a:schemeClr val="tx1"/>
+            </a:solidFill>
+          </a:ln>
         </p:spPr>
       </p:pic>
       <p:pic>
         <p:nvPicPr>
-          <p:cNvPr id="9" name="Picture 8"/>
+          <p:cNvPr id="14" name="Picture 13"/>
           <p:cNvPicPr>
             <a:picLocks noChangeAspect="1"/>
           </p:cNvPicPr>
@@ -5069,60 +6432,19 @@
         </p:blipFill>
         <p:spPr>
           <a:xfrm>
-            <a:off x="7583647" y="4358684"/>
-            <a:ext cx="4079846" cy="732648"/>
+            <a:off x="9679041" y="4594874"/>
+            <a:ext cx="2218570" cy="1663928"/>
           </a:xfrm>
           <a:prstGeom prst="rect">
             <a:avLst/>
           </a:prstGeom>
-        </p:spPr>
-      </p:pic>
-      <p:sp>
-        <p:nvSpPr>
-          <p:cNvPr id="10" name="Rectangle 9"/>
-          <p:cNvSpPr/>
-          <p:nvPr/>
-        </p:nvSpPr>
-        <p:spPr>
-          <a:xfrm>
-            <a:off x="10385571" y="4655890"/>
-            <a:ext cx="297109" cy="435442"/>
-          </a:xfrm>
-          <a:prstGeom prst="rect">
-            <a:avLst/>
-          </a:prstGeom>
-          <a:noFill/>
-          <a:ln w="38100">
+          <a:ln w="12700">
             <a:solidFill>
-              <a:srgbClr val="FF0000"/>
+              <a:schemeClr val="tx1"/>
             </a:solidFill>
           </a:ln>
         </p:spPr>
-        <p:style>
-          <a:lnRef idx="2">
-            <a:schemeClr val="accent1">
-              <a:shade val="50000"/>
-            </a:schemeClr>
-          </a:lnRef>
-          <a:fillRef idx="1">
-            <a:schemeClr val="accent1"/>
-          </a:fillRef>
-          <a:effectRef idx="0">
-            <a:schemeClr val="accent1"/>
-          </a:effectRef>
-          <a:fontRef idx="minor">
-            <a:schemeClr val="lt1"/>
-          </a:fontRef>
-        </p:style>
-        <p:txBody>
-          <a:bodyPr rtlCol="0" anchor="ctr"/>
-          <a:lstStyle/>
-          <a:p>
-            <a:pPr algn="ctr"/>
-            <a:endParaRPr lang="en-US"/>
-          </a:p>
-        </p:txBody>
-      </p:sp>
+      </p:pic>
     </p:spTree>
     <p:extLst>
       <p:ext uri="{BB962C8B-B14F-4D97-AF65-F5344CB8AC3E}">
@@ -5153,6 +6475,137 @@
           <a:chExt cx="0" cy="0"/>
         </a:xfrm>
       </p:grpSpPr>
+      <p:grpSp>
+        <p:nvGrpSpPr>
+          <p:cNvPr id="44" name="Group 43"/>
+          <p:cNvGrpSpPr/>
+          <p:nvPr/>
+        </p:nvGrpSpPr>
+        <p:grpSpPr>
+          <a:xfrm>
+            <a:off x="7813844" y="3357183"/>
+            <a:ext cx="4079846" cy="749355"/>
+            <a:chOff x="7813844" y="3357183"/>
+            <a:chExt cx="4079846" cy="749355"/>
+          </a:xfrm>
+        </p:grpSpPr>
+        <p:pic>
+          <p:nvPicPr>
+            <p:cNvPr id="9" name="Picture 8"/>
+            <p:cNvPicPr>
+              <a:picLocks noChangeAspect="1"/>
+            </p:cNvPicPr>
+            <p:nvPr/>
+          </p:nvPicPr>
+          <p:blipFill>
+            <a:blip r:embed="rId2"/>
+            <a:stretch>
+              <a:fillRect/>
+            </a:stretch>
+          </p:blipFill>
+          <p:spPr>
+            <a:xfrm>
+              <a:off x="7813844" y="3357183"/>
+              <a:ext cx="4079846" cy="732648"/>
+            </a:xfrm>
+            <a:prstGeom prst="rect">
+              <a:avLst/>
+            </a:prstGeom>
+          </p:spPr>
+        </p:pic>
+        <p:sp>
+          <p:nvSpPr>
+            <p:cNvPr id="10" name="Rectangle 9"/>
+            <p:cNvSpPr/>
+            <p:nvPr/>
+          </p:nvSpPr>
+          <p:spPr>
+            <a:xfrm>
+              <a:off x="10648217" y="3654389"/>
+              <a:ext cx="297109" cy="435442"/>
+            </a:xfrm>
+            <a:prstGeom prst="rect">
+              <a:avLst/>
+            </a:prstGeom>
+            <a:noFill/>
+            <a:ln w="38100">
+              <a:solidFill>
+                <a:srgbClr val="FF0000"/>
+              </a:solidFill>
+            </a:ln>
+          </p:spPr>
+          <p:style>
+            <a:lnRef idx="2">
+              <a:schemeClr val="accent1">
+                <a:shade val="50000"/>
+              </a:schemeClr>
+            </a:lnRef>
+            <a:fillRef idx="1">
+              <a:schemeClr val="accent1"/>
+            </a:fillRef>
+            <a:effectRef idx="0">
+              <a:schemeClr val="accent1"/>
+            </a:effectRef>
+            <a:fontRef idx="minor">
+              <a:schemeClr val="lt1"/>
+            </a:fontRef>
+          </p:style>
+          <p:txBody>
+            <a:bodyPr rtlCol="0" anchor="ctr"/>
+            <a:lstStyle/>
+            <a:p>
+              <a:pPr algn="ctr"/>
+              <a:endParaRPr lang="en-US"/>
+            </a:p>
+          </p:txBody>
+        </p:sp>
+        <p:sp>
+          <p:nvSpPr>
+            <p:cNvPr id="28" name="Rectangle 27"/>
+            <p:cNvSpPr/>
+            <p:nvPr/>
+          </p:nvSpPr>
+          <p:spPr>
+            <a:xfrm>
+              <a:off x="8476308" y="3671096"/>
+              <a:ext cx="297109" cy="435442"/>
+            </a:xfrm>
+            <a:prstGeom prst="rect">
+              <a:avLst/>
+            </a:prstGeom>
+            <a:noFill/>
+            <a:ln w="38100">
+              <a:solidFill>
+                <a:srgbClr val="FF0000"/>
+              </a:solidFill>
+            </a:ln>
+          </p:spPr>
+          <p:style>
+            <a:lnRef idx="2">
+              <a:schemeClr val="accent1">
+                <a:shade val="50000"/>
+              </a:schemeClr>
+            </a:lnRef>
+            <a:fillRef idx="1">
+              <a:schemeClr val="accent1"/>
+            </a:fillRef>
+            <a:effectRef idx="0">
+              <a:schemeClr val="accent1"/>
+            </a:effectRef>
+            <a:fontRef idx="minor">
+              <a:schemeClr val="lt1"/>
+            </a:fontRef>
+          </p:style>
+          <p:txBody>
+            <a:bodyPr rtlCol="0" anchor="ctr"/>
+            <a:lstStyle/>
+            <a:p>
+              <a:pPr algn="ctr"/>
+              <a:endParaRPr lang="en-US"/>
+            </a:p>
+          </p:txBody>
+        </p:sp>
+      </p:grpSp>
       <p:sp>
         <p:nvSpPr>
           <p:cNvPr id="2" name="Title 1"/>
@@ -5163,14 +6616,19 @@
             <p:ph type="title"/>
           </p:nvPr>
         </p:nvSpPr>
-        <p:spPr/>
+        <p:spPr>
+          <a:xfrm>
+            <a:off x="167080" y="-297409"/>
+            <a:ext cx="10515600" cy="1325563"/>
+          </a:xfrm>
+        </p:spPr>
         <p:txBody>
           <a:bodyPr/>
           <a:lstStyle/>
           <a:p>
             <a:r>
               <a:rPr lang="en-US" dirty="0"/>
-              <a:t>Some other graphing capabilities to try</a:t>
+              <a:t>Plotting in 2D and 3D</a:t>
             </a:r>
           </a:p>
         </p:txBody>
@@ -5187,8 +6645,8 @@
         </p:nvSpPr>
         <p:spPr>
           <a:xfrm>
-            <a:off x="922090" y="1690688"/>
-            <a:ext cx="10515600" cy="4351338"/>
+            <a:off x="171694" y="890185"/>
+            <a:ext cx="6876281" cy="4168555"/>
           </a:xfrm>
         </p:spPr>
         <p:txBody>
@@ -5201,16 +6659,79 @@
               <a:buNone/>
             </a:pPr>
             <a:r>
-              <a:rPr lang="en-US" dirty="0"/>
-              <a:t>Download the Boston Marathon results from </a:t>
-            </a:r>
-            <a:r>
-              <a:rPr lang="en-US" dirty="0" err="1"/>
-              <a:t>github</a:t>
-            </a:r>
-            <a:r>
-              <a:rPr lang="en-US" dirty="0"/>
-              <a:t> and make some other graphs</a:t>
+              <a:rPr lang="en-US" u="sng" dirty="0"/>
+              <a:t>Using the GUI to plot graphs</a:t>
+            </a:r>
+          </a:p>
+          <a:p>
+            <a:pPr marL="514350" indent="-514350">
+              <a:buFont typeface="+mj-lt"/>
+              <a:buAutoNum type="arabicPeriod"/>
+            </a:pPr>
+            <a:r>
+              <a:rPr lang="en-US" dirty="0"/>
+              <a:t>Select the variable you want to plot</a:t>
+            </a:r>
+          </a:p>
+          <a:p>
+            <a:pPr lvl="1"/>
+            <a:r>
+              <a:rPr lang="en-US" dirty="0"/>
+              <a:t>Select X then Y for plotting 2D plots</a:t>
+            </a:r>
+          </a:p>
+          <a:p>
+            <a:pPr marL="514350" indent="-514350">
+              <a:buFont typeface="+mj-lt"/>
+              <a:buAutoNum type="arabicPeriod"/>
+            </a:pPr>
+            <a:r>
+              <a:rPr lang="en-US" dirty="0"/>
+              <a:t>Click on the type of plot you want to use</a:t>
+            </a:r>
+          </a:p>
+          <a:p>
+            <a:pPr marL="514350" indent="-514350">
+              <a:buFont typeface="+mj-lt"/>
+              <a:buAutoNum type="arabicPeriod"/>
+            </a:pPr>
+            <a:r>
+              <a:rPr lang="en-US" dirty="0"/>
+              <a:t>Open Plot Tools and Dock Figure</a:t>
+            </a:r>
+          </a:p>
+          <a:p>
+            <a:pPr marL="514350" indent="-514350">
+              <a:buFont typeface="+mj-lt"/>
+              <a:buAutoNum type="arabicPeriod"/>
+            </a:pPr>
+            <a:r>
+              <a:rPr lang="en-US" dirty="0"/>
+              <a:t>Select parts of the graph  to configure them</a:t>
+            </a:r>
+          </a:p>
+          <a:p>
+            <a:pPr lvl="1"/>
+            <a:r>
+              <a:rPr lang="en-US" dirty="0"/>
+              <a:t>Use the “edit plot” curser to select parts of the plot</a:t>
+            </a:r>
+          </a:p>
+          <a:p>
+            <a:pPr lvl="1"/>
+            <a:r>
+              <a:rPr lang="en-US" dirty="0"/>
+              <a:t>Blue squares should show up on whatever part is selected for formatting (figure, plot, data)</a:t>
+            </a:r>
+          </a:p>
+          <a:p>
+            <a:pPr marL="514350" indent="-514350">
+              <a:buFont typeface="+mj-lt"/>
+              <a:buAutoNum type="arabicPeriod"/>
+            </a:pPr>
+            <a:r>
+              <a:rPr lang="en-US" dirty="0"/>
+              <a:t>Use the Property Editor to edit the figure</a:t>
             </a:r>
           </a:p>
           <a:p>
@@ -5219,50 +6740,350 @@
             </a:pPr>
             <a:endParaRPr lang="en-US" dirty="0"/>
           </a:p>
-          <a:p>
-            <a:pPr marL="0" indent="0">
-              <a:buNone/>
-            </a:pPr>
-            <a:r>
-              <a:rPr lang="en-US" dirty="0"/>
-              <a:t>Some things to try</a:t>
-            </a:r>
-          </a:p>
-          <a:p>
-            <a:r>
-              <a:rPr lang="en-US" dirty="0"/>
-              <a:t>Histograms of race results</a:t>
-            </a:r>
-          </a:p>
-          <a:p>
-            <a:r>
-              <a:rPr lang="en-US" dirty="0"/>
-              <a:t>Multiple line 2D plot</a:t>
-            </a:r>
-            <a:endParaRPr lang="en-US" dirty="0"/>
-          </a:p>
-          <a:p>
-            <a:r>
-              <a:rPr lang="en-US" dirty="0"/>
-              <a:t>3D plotting</a:t>
-            </a:r>
-          </a:p>
-          <a:p>
-            <a:r>
-              <a:rPr lang="en-US" dirty="0"/>
-              <a:t>Break down results by gender/age</a:t>
-            </a:r>
-          </a:p>
-          <a:p>
-            <a:endParaRPr lang="en-US" dirty="0"/>
-          </a:p>
-          <a:p>
-            <a:pPr marL="0" indent="0">
-              <a:buNone/>
-            </a:pPr>
-            <a:r>
-              <a:rPr lang="en-US" dirty="0"/>
-              <a:t>Tomorrow’s session will focus more on fitting and data analysis</a:t>
+        </p:txBody>
+      </p:sp>
+      <p:pic>
+        <p:nvPicPr>
+          <p:cNvPr id="7" name="Picture 6"/>
+          <p:cNvPicPr>
+            <a:picLocks noChangeAspect="1"/>
+          </p:cNvPicPr>
+          <p:nvPr/>
+        </p:nvPicPr>
+        <p:blipFill rotWithShape="1">
+          <a:blip r:embed="rId3"/>
+          <a:srcRect r="18527"/>
+          <a:stretch/>
+        </p:blipFill>
+        <p:spPr>
+          <a:xfrm>
+            <a:off x="7858825" y="453162"/>
+            <a:ext cx="3881595" cy="999128"/>
+          </a:xfrm>
+          <a:prstGeom prst="rect">
+            <a:avLst/>
+          </a:prstGeom>
+        </p:spPr>
+      </p:pic>
+      <p:pic>
+        <p:nvPicPr>
+          <p:cNvPr id="8" name="Picture 7"/>
+          <p:cNvPicPr>
+            <a:picLocks noChangeAspect="1"/>
+          </p:cNvPicPr>
+          <p:nvPr/>
+        </p:nvPicPr>
+        <p:blipFill rotWithShape="1">
+          <a:blip r:embed="rId4"/>
+          <a:srcRect r="33135"/>
+          <a:stretch/>
+        </p:blipFill>
+        <p:spPr>
+          <a:xfrm>
+            <a:off x="8456853" y="1790380"/>
+            <a:ext cx="3263479" cy="942653"/>
+          </a:xfrm>
+          <a:prstGeom prst="rect">
+            <a:avLst/>
+          </a:prstGeom>
+        </p:spPr>
+      </p:pic>
+      <p:cxnSp>
+        <p:nvCxnSpPr>
+          <p:cNvPr id="12" name="Straight Arrow Connector 11"/>
+          <p:cNvCxnSpPr/>
+          <p:nvPr/>
+        </p:nvCxnSpPr>
+        <p:spPr>
+          <a:xfrm flipV="1">
+            <a:off x="5719864" y="1221937"/>
+            <a:ext cx="2051243" cy="278986"/>
+          </a:xfrm>
+          <a:prstGeom prst="straightConnector1">
+            <a:avLst/>
+          </a:prstGeom>
+          <a:ln w="38100">
+            <a:solidFill>
+              <a:schemeClr val="tx1"/>
+            </a:solidFill>
+            <a:tailEnd type="triangle"/>
+          </a:ln>
+        </p:spPr>
+        <p:style>
+          <a:lnRef idx="1">
+            <a:schemeClr val="accent1"/>
+          </a:lnRef>
+          <a:fillRef idx="0">
+            <a:schemeClr val="accent1"/>
+          </a:fillRef>
+          <a:effectRef idx="0">
+            <a:schemeClr val="accent1"/>
+          </a:effectRef>
+          <a:fontRef idx="minor">
+            <a:schemeClr val="tx1"/>
+          </a:fontRef>
+        </p:style>
+      </p:cxnSp>
+      <p:cxnSp>
+        <p:nvCxnSpPr>
+          <p:cNvPr id="14" name="Straight Arrow Connector 13"/>
+          <p:cNvCxnSpPr/>
+          <p:nvPr/>
+        </p:nvCxnSpPr>
+        <p:spPr>
+          <a:xfrm>
+            <a:off x="6358593" y="2308866"/>
+            <a:ext cx="3729999" cy="12064"/>
+          </a:xfrm>
+          <a:prstGeom prst="straightConnector1">
+            <a:avLst/>
+          </a:prstGeom>
+          <a:ln w="38100">
+            <a:solidFill>
+              <a:schemeClr val="tx1"/>
+            </a:solidFill>
+            <a:tailEnd type="triangle"/>
+          </a:ln>
+        </p:spPr>
+        <p:style>
+          <a:lnRef idx="1">
+            <a:schemeClr val="accent1"/>
+          </a:lnRef>
+          <a:fillRef idx="0">
+            <a:schemeClr val="accent1"/>
+          </a:fillRef>
+          <a:effectRef idx="0">
+            <a:schemeClr val="accent1"/>
+          </a:effectRef>
+          <a:fontRef idx="minor">
+            <a:schemeClr val="tx1"/>
+          </a:fontRef>
+        </p:style>
+      </p:cxnSp>
+      <p:cxnSp>
+        <p:nvCxnSpPr>
+          <p:cNvPr id="18" name="Straight Arrow Connector 17"/>
+          <p:cNvCxnSpPr/>
+          <p:nvPr/>
+        </p:nvCxnSpPr>
+        <p:spPr>
+          <a:xfrm>
+            <a:off x="5719864" y="2793699"/>
+            <a:ext cx="4834647" cy="1011340"/>
+          </a:xfrm>
+          <a:prstGeom prst="straightConnector1">
+            <a:avLst/>
+          </a:prstGeom>
+          <a:ln w="38100">
+            <a:solidFill>
+              <a:schemeClr val="tx1"/>
+            </a:solidFill>
+            <a:tailEnd type="triangle"/>
+          </a:ln>
+        </p:spPr>
+        <p:style>
+          <a:lnRef idx="1">
+            <a:schemeClr val="accent1"/>
+          </a:lnRef>
+          <a:fillRef idx="0">
+            <a:schemeClr val="accent1"/>
+          </a:fillRef>
+          <a:effectRef idx="0">
+            <a:schemeClr val="accent1"/>
+          </a:effectRef>
+          <a:fontRef idx="minor">
+            <a:schemeClr val="tx1"/>
+          </a:fontRef>
+        </p:style>
+      </p:cxnSp>
+      <p:pic>
+        <p:nvPicPr>
+          <p:cNvPr id="21" name="Picture 20"/>
+          <p:cNvPicPr>
+            <a:picLocks noChangeAspect="1"/>
+          </p:cNvPicPr>
+          <p:nvPr/>
+        </p:nvPicPr>
+        <p:blipFill>
+          <a:blip r:embed="rId5"/>
+          <a:stretch>
+            <a:fillRect/>
+          </a:stretch>
+        </p:blipFill>
+        <p:spPr>
+          <a:xfrm>
+            <a:off x="9343712" y="4265897"/>
+            <a:ext cx="2141794" cy="1273367"/>
+          </a:xfrm>
+          <a:prstGeom prst="rect">
+            <a:avLst/>
+          </a:prstGeom>
+        </p:spPr>
+      </p:pic>
+      <p:cxnSp>
+        <p:nvCxnSpPr>
+          <p:cNvPr id="22" name="Straight Arrow Connector 21"/>
+          <p:cNvCxnSpPr/>
+          <p:nvPr/>
+        </p:nvCxnSpPr>
+        <p:spPr>
+          <a:xfrm>
+            <a:off x="6378759" y="4061583"/>
+            <a:ext cx="2784696" cy="840997"/>
+          </a:xfrm>
+          <a:prstGeom prst="straightConnector1">
+            <a:avLst/>
+          </a:prstGeom>
+          <a:ln w="38100">
+            <a:solidFill>
+              <a:schemeClr val="tx1"/>
+            </a:solidFill>
+            <a:tailEnd type="triangle"/>
+          </a:ln>
+        </p:spPr>
+        <p:style>
+          <a:lnRef idx="1">
+            <a:schemeClr val="accent1"/>
+          </a:lnRef>
+          <a:fillRef idx="0">
+            <a:schemeClr val="accent1"/>
+          </a:fillRef>
+          <a:effectRef idx="0">
+            <a:schemeClr val="accent1"/>
+          </a:effectRef>
+          <a:fontRef idx="minor">
+            <a:schemeClr val="tx1"/>
+          </a:fontRef>
+        </p:style>
+      </p:cxnSp>
+      <p:cxnSp>
+        <p:nvCxnSpPr>
+          <p:cNvPr id="25" name="Straight Arrow Connector 24"/>
+          <p:cNvCxnSpPr/>
+          <p:nvPr/>
+        </p:nvCxnSpPr>
+        <p:spPr>
+          <a:xfrm>
+            <a:off x="6832655" y="3553349"/>
+            <a:ext cx="1479454" cy="386368"/>
+          </a:xfrm>
+          <a:prstGeom prst="straightConnector1">
+            <a:avLst/>
+          </a:prstGeom>
+          <a:ln w="38100">
+            <a:solidFill>
+              <a:schemeClr val="tx1"/>
+            </a:solidFill>
+            <a:tailEnd type="triangle"/>
+          </a:ln>
+        </p:spPr>
+        <p:style>
+          <a:lnRef idx="1">
+            <a:schemeClr val="accent1"/>
+          </a:lnRef>
+          <a:fillRef idx="0">
+            <a:schemeClr val="accent1"/>
+          </a:fillRef>
+          <a:effectRef idx="0">
+            <a:schemeClr val="accent1"/>
+          </a:effectRef>
+          <a:fontRef idx="minor">
+            <a:schemeClr val="tx1"/>
+          </a:fontRef>
+        </p:style>
+      </p:cxnSp>
+      <p:pic>
+        <p:nvPicPr>
+          <p:cNvPr id="38" name="Picture 37"/>
+          <p:cNvPicPr>
+            <a:picLocks noChangeAspect="1"/>
+          </p:cNvPicPr>
+          <p:nvPr/>
+        </p:nvPicPr>
+        <p:blipFill>
+          <a:blip r:embed="rId6"/>
+          <a:stretch>
+            <a:fillRect/>
+          </a:stretch>
+        </p:blipFill>
+        <p:spPr>
+          <a:xfrm>
+            <a:off x="5606401" y="5644649"/>
+            <a:ext cx="6350983" cy="936312"/>
+          </a:xfrm>
+          <a:prstGeom prst="rect">
+            <a:avLst/>
+          </a:prstGeom>
+        </p:spPr>
+      </p:pic>
+      <p:cxnSp>
+        <p:nvCxnSpPr>
+          <p:cNvPr id="39" name="Straight Arrow Connector 38"/>
+          <p:cNvCxnSpPr/>
+          <p:nvPr/>
+        </p:nvCxnSpPr>
+        <p:spPr>
+          <a:xfrm>
+            <a:off x="6358593" y="4653310"/>
+            <a:ext cx="1188251" cy="890264"/>
+          </a:xfrm>
+          <a:prstGeom prst="straightConnector1">
+            <a:avLst/>
+          </a:prstGeom>
+          <a:ln w="38100">
+            <a:solidFill>
+              <a:schemeClr val="tx1"/>
+            </a:solidFill>
+            <a:tailEnd type="triangle"/>
+          </a:ln>
+        </p:spPr>
+        <p:style>
+          <a:lnRef idx="1">
+            <a:schemeClr val="accent1"/>
+          </a:lnRef>
+          <a:fillRef idx="0">
+            <a:schemeClr val="accent1"/>
+          </a:fillRef>
+          <a:effectRef idx="0">
+            <a:schemeClr val="accent1"/>
+          </a:effectRef>
+          <a:fontRef idx="minor">
+            <a:schemeClr val="tx1"/>
+          </a:fontRef>
+        </p:style>
+      </p:cxnSp>
+      <p:sp>
+        <p:nvSpPr>
+          <p:cNvPr id="46" name="Rectangle 45"/>
+          <p:cNvSpPr/>
+          <p:nvPr/>
+        </p:nvSpPr>
+        <p:spPr>
+          <a:xfrm>
+            <a:off x="282759" y="5029564"/>
+            <a:ext cx="6096000" cy="646331"/>
+          </a:xfrm>
+          <a:prstGeom prst="rect">
+            <a:avLst/>
+          </a:prstGeom>
+        </p:spPr>
+        <p:txBody>
+          <a:bodyPr>
+            <a:spAutoFit/>
+          </a:bodyPr>
+          <a:lstStyle/>
+          <a:p>
+            <a:r>
+              <a:rPr lang="en-US" b="1" i="1" dirty="0"/>
+              <a:t>Try to replicate the graphs from the previous section (slide 12) using the </a:t>
+            </a:r>
+            <a:r>
+              <a:rPr lang="en-US" b="1" i="1" dirty="0" err="1"/>
+              <a:t>Matlab</a:t>
+            </a:r>
+            <a:r>
+              <a:rPr lang="en-US" b="1" i="1" dirty="0"/>
+              <a:t> plotting GUI</a:t>
             </a:r>
           </a:p>
         </p:txBody>
@@ -5270,7 +7091,7 @@
     </p:spTree>
     <p:extLst>
       <p:ext uri="{BB962C8B-B14F-4D97-AF65-F5344CB8AC3E}">
-        <p14:creationId xmlns:p14="http://schemas.microsoft.com/office/powerpoint/2010/main" val="4283949246"/>
+        <p14:creationId xmlns:p14="http://schemas.microsoft.com/office/powerpoint/2010/main" val="459215427"/>
       </p:ext>
     </p:extLst>
   </p:cSld>

</xml_diff>